<commit_message>
projet smart patate 2
</commit_message>
<xml_diff>
--- a/Projet smart-patate.pptx
+++ b/Projet smart-patate.pptx
@@ -7,6 +7,9 @@
   <p:sldIdLst>
     <p:sldId id="256" r:id="rId2"/>
     <p:sldId id="257" r:id="rId3"/>
+    <p:sldId id="258" r:id="rId4"/>
+    <p:sldId id="259" r:id="rId5"/>
+    <p:sldId id="260" r:id="rId6"/>
   </p:sldIdLst>
   <p:sldSz cx="12192000" cy="6858000"/>
   <p:notesSz cx="6858000" cy="9144000"/>
@@ -163,7 +166,7 @@
           <a:noFill/>
           <a:extLst>
             <a:ext uri="{909E8E84-426E-40dd-AFC4-6F175D3DCCD1}">
-              <a14:hiddenFill xmlns="" xmlns:a14="http://schemas.microsoft.com/office/drawing/2010/main">
+              <a14:hiddenFill xmlns:a14="http://schemas.microsoft.com/office/drawing/2010/main" xmlns="">
                 <a:solidFill>
                   <a:srgbClr val="FFFFFF"/>
                 </a:solidFill>
@@ -223,7 +226,7 @@
             </a:ln>
             <a:extLst>
               <a:ext uri="{91240B29-F687-4f45-9708-019B960494DF}">
-                <a14:hiddenLine xmlns="" xmlns:a14="http://schemas.microsoft.com/office/drawing/2010/main" w="9525">
+                <a14:hiddenLine xmlns:a14="http://schemas.microsoft.com/office/drawing/2010/main" xmlns="" w="9525">
                   <a:solidFill>
                     <a:srgbClr val="000000"/>
                   </a:solidFill>
@@ -313,7 +316,7 @@
             </a:ln>
             <a:extLst>
               <a:ext uri="{91240B29-F687-4f45-9708-019B960494DF}">
-                <a14:hiddenLine xmlns="" xmlns:a14="http://schemas.microsoft.com/office/drawing/2010/main" w="9525">
+                <a14:hiddenLine xmlns:a14="http://schemas.microsoft.com/office/drawing/2010/main" xmlns="" w="9525">
                   <a:solidFill>
                     <a:srgbClr val="000000"/>
                   </a:solidFill>
@@ -403,7 +406,7 @@
             </a:ln>
             <a:extLst>
               <a:ext uri="{91240B29-F687-4f45-9708-019B960494DF}">
-                <a14:hiddenLine xmlns="" xmlns:a14="http://schemas.microsoft.com/office/drawing/2010/main" w="9525">
+                <a14:hiddenLine xmlns:a14="http://schemas.microsoft.com/office/drawing/2010/main" xmlns="" w="9525">
                   <a:solidFill>
                     <a:srgbClr val="000000"/>
                   </a:solidFill>
@@ -437,7 +440,7 @@
             </a:ln>
             <a:extLst>
               <a:ext uri="{91240B29-F687-4f45-9708-019B960494DF}">
-                <a14:hiddenLine xmlns="" xmlns:a14="http://schemas.microsoft.com/office/drawing/2010/main" w="9525">
+                <a14:hiddenLine xmlns:a14="http://schemas.microsoft.com/office/drawing/2010/main" xmlns="" w="9525">
                   <a:solidFill>
                     <a:srgbClr val="000000"/>
                   </a:solidFill>
@@ -527,7 +530,7 @@
             </a:ln>
             <a:extLst>
               <a:ext uri="{91240B29-F687-4f45-9708-019B960494DF}">
-                <a14:hiddenLine xmlns="" xmlns:a14="http://schemas.microsoft.com/office/drawing/2010/main" w="9525">
+                <a14:hiddenLine xmlns:a14="http://schemas.microsoft.com/office/drawing/2010/main" xmlns="" w="9525">
                   <a:solidFill>
                     <a:srgbClr val="000000"/>
                   </a:solidFill>
@@ -589,7 +592,7 @@
             </a:ln>
             <a:extLst>
               <a:ext uri="{91240B29-F687-4f45-9708-019B960494DF}">
-                <a14:hiddenLine xmlns="" xmlns:a14="http://schemas.microsoft.com/office/drawing/2010/main" w="9525">
+                <a14:hiddenLine xmlns:a14="http://schemas.microsoft.com/office/drawing/2010/main" xmlns="" w="9525">
                   <a:solidFill>
                     <a:srgbClr val="000000"/>
                   </a:solidFill>
@@ -651,7 +654,7 @@
             </a:ln>
             <a:extLst>
               <a:ext uri="{91240B29-F687-4f45-9708-019B960494DF}">
-                <a14:hiddenLine xmlns="" xmlns:a14="http://schemas.microsoft.com/office/drawing/2010/main" w="9525">
+                <a14:hiddenLine xmlns:a14="http://schemas.microsoft.com/office/drawing/2010/main" xmlns="" w="9525">
                   <a:solidFill>
                     <a:srgbClr val="000000"/>
                   </a:solidFill>
@@ -741,7 +744,7 @@
             </a:ln>
             <a:extLst>
               <a:ext uri="{91240B29-F687-4f45-9708-019B960494DF}">
-                <a14:hiddenLine xmlns="" xmlns:a14="http://schemas.microsoft.com/office/drawing/2010/main" w="9525">
+                <a14:hiddenLine xmlns:a14="http://schemas.microsoft.com/office/drawing/2010/main" xmlns="" w="9525">
                   <a:solidFill>
                     <a:srgbClr val="000000"/>
                   </a:solidFill>
@@ -803,7 +806,7 @@
             </a:ln>
             <a:extLst>
               <a:ext uri="{91240B29-F687-4f45-9708-019B960494DF}">
-                <a14:hiddenLine xmlns="" xmlns:a14="http://schemas.microsoft.com/office/drawing/2010/main" w="9525">
+                <a14:hiddenLine xmlns:a14="http://schemas.microsoft.com/office/drawing/2010/main" xmlns="" w="9525">
                   <a:solidFill>
                     <a:srgbClr val="000000"/>
                   </a:solidFill>
@@ -865,7 +868,7 @@
             </a:ln>
             <a:extLst>
               <a:ext uri="{91240B29-F687-4f45-9708-019B960494DF}">
-                <a14:hiddenLine xmlns="" xmlns:a14="http://schemas.microsoft.com/office/drawing/2010/main" w="9525">
+                <a14:hiddenLine xmlns:a14="http://schemas.microsoft.com/office/drawing/2010/main" xmlns="" w="9525">
                   <a:solidFill>
                     <a:srgbClr val="000000"/>
                   </a:solidFill>
@@ -955,7 +958,7 @@
             </a:ln>
             <a:extLst>
               <a:ext uri="{91240B29-F687-4f45-9708-019B960494DF}">
-                <a14:hiddenLine xmlns="" xmlns:a14="http://schemas.microsoft.com/office/drawing/2010/main" w="9525">
+                <a14:hiddenLine xmlns:a14="http://schemas.microsoft.com/office/drawing/2010/main" xmlns="" w="9525">
                   <a:solidFill>
                     <a:srgbClr val="000000"/>
                   </a:solidFill>
@@ -1045,7 +1048,7 @@
             </a:ln>
             <a:extLst>
               <a:ext uri="{91240B29-F687-4f45-9708-019B960494DF}">
-                <a14:hiddenLine xmlns="" xmlns:a14="http://schemas.microsoft.com/office/drawing/2010/main" w="9525">
+                <a14:hiddenLine xmlns:a14="http://schemas.microsoft.com/office/drawing/2010/main" xmlns="" w="9525">
                   <a:solidFill>
                     <a:srgbClr val="000000"/>
                   </a:solidFill>
@@ -1107,7 +1110,7 @@
             </a:ln>
             <a:extLst>
               <a:ext uri="{91240B29-F687-4f45-9708-019B960494DF}">
-                <a14:hiddenLine xmlns="" xmlns:a14="http://schemas.microsoft.com/office/drawing/2010/main" w="9525">
+                <a14:hiddenLine xmlns:a14="http://schemas.microsoft.com/office/drawing/2010/main" xmlns="" w="9525">
                   <a:solidFill>
                     <a:srgbClr val="000000"/>
                   </a:solidFill>
@@ -1217,7 +1220,7 @@
             </a:ln>
             <a:extLst>
               <a:ext uri="{91240B29-F687-4f45-9708-019B960494DF}">
-                <a14:hiddenLine xmlns="" xmlns:a14="http://schemas.microsoft.com/office/drawing/2010/main" w="9525">
+                <a14:hiddenLine xmlns:a14="http://schemas.microsoft.com/office/drawing/2010/main" xmlns="" w="9525">
                   <a:solidFill>
                     <a:srgbClr val="000000"/>
                   </a:solidFill>
@@ -1279,7 +1282,7 @@
             </a:ln>
             <a:extLst>
               <a:ext uri="{91240B29-F687-4f45-9708-019B960494DF}">
-                <a14:hiddenLine xmlns="" xmlns:a14="http://schemas.microsoft.com/office/drawing/2010/main" w="9525">
+                <a14:hiddenLine xmlns:a14="http://schemas.microsoft.com/office/drawing/2010/main" xmlns="" w="9525">
                   <a:solidFill>
                     <a:srgbClr val="000000"/>
                   </a:solidFill>
@@ -1369,7 +1372,7 @@
             </a:ln>
             <a:extLst>
               <a:ext uri="{91240B29-F687-4f45-9708-019B960494DF}">
-                <a14:hiddenLine xmlns="" xmlns:a14="http://schemas.microsoft.com/office/drawing/2010/main" w="9525">
+                <a14:hiddenLine xmlns:a14="http://schemas.microsoft.com/office/drawing/2010/main" xmlns="" w="9525">
                   <a:solidFill>
                     <a:srgbClr val="000000"/>
                   </a:solidFill>
@@ -1459,7 +1462,7 @@
             </a:ln>
             <a:extLst>
               <a:ext uri="{91240B29-F687-4f45-9708-019B960494DF}">
-                <a14:hiddenLine xmlns="" xmlns:a14="http://schemas.microsoft.com/office/drawing/2010/main" w="9525">
+                <a14:hiddenLine xmlns:a14="http://schemas.microsoft.com/office/drawing/2010/main" xmlns="" w="9525">
                   <a:solidFill>
                     <a:srgbClr val="000000"/>
                   </a:solidFill>
@@ -1521,7 +1524,7 @@
             </a:ln>
             <a:extLst>
               <a:ext uri="{91240B29-F687-4f45-9708-019B960494DF}">
-                <a14:hiddenLine xmlns="" xmlns:a14="http://schemas.microsoft.com/office/drawing/2010/main" w="9525">
+                <a14:hiddenLine xmlns:a14="http://schemas.microsoft.com/office/drawing/2010/main" xmlns="" w="9525">
                   <a:solidFill>
                     <a:srgbClr val="000000"/>
                   </a:solidFill>
@@ -1611,7 +1614,7 @@
             </a:ln>
             <a:extLst>
               <a:ext uri="{91240B29-F687-4f45-9708-019B960494DF}">
-                <a14:hiddenLine xmlns="" xmlns:a14="http://schemas.microsoft.com/office/drawing/2010/main" w="9525">
+                <a14:hiddenLine xmlns:a14="http://schemas.microsoft.com/office/drawing/2010/main" xmlns="" w="9525">
                   <a:solidFill>
                     <a:srgbClr val="000000"/>
                   </a:solidFill>
@@ -1701,7 +1704,7 @@
             </a:ln>
             <a:extLst>
               <a:ext uri="{91240B29-F687-4f45-9708-019B960494DF}">
-                <a14:hiddenLine xmlns="" xmlns:a14="http://schemas.microsoft.com/office/drawing/2010/main" w="9525">
+                <a14:hiddenLine xmlns:a14="http://schemas.microsoft.com/office/drawing/2010/main" xmlns="" w="9525">
                   <a:solidFill>
                     <a:srgbClr val="000000"/>
                   </a:solidFill>
@@ -1757,7 +1760,7 @@
             </a:ln>
             <a:extLst>
               <a:ext uri="{91240B29-F687-4f45-9708-019B960494DF}">
-                <a14:hiddenLine xmlns="" xmlns:a14="http://schemas.microsoft.com/office/drawing/2010/main" w="9525">
+                <a14:hiddenLine xmlns:a14="http://schemas.microsoft.com/office/drawing/2010/main" xmlns="" w="9525">
                   <a:solidFill>
                     <a:srgbClr val="000000"/>
                   </a:solidFill>
@@ -1847,7 +1850,7 @@
             </a:ln>
             <a:extLst>
               <a:ext uri="{91240B29-F687-4f45-9708-019B960494DF}">
-                <a14:hiddenLine xmlns="" xmlns:a14="http://schemas.microsoft.com/office/drawing/2010/main" w="9525">
+                <a14:hiddenLine xmlns:a14="http://schemas.microsoft.com/office/drawing/2010/main" xmlns="" w="9525">
                   <a:solidFill>
                     <a:srgbClr val="000000"/>
                   </a:solidFill>
@@ -1903,7 +1906,7 @@
             </a:ln>
             <a:extLst>
               <a:ext uri="{91240B29-F687-4f45-9708-019B960494DF}">
-                <a14:hiddenLine xmlns="" xmlns:a14="http://schemas.microsoft.com/office/drawing/2010/main" w="9525">
+                <a14:hiddenLine xmlns:a14="http://schemas.microsoft.com/office/drawing/2010/main" xmlns="" w="9525">
                   <a:solidFill>
                     <a:srgbClr val="000000"/>
                   </a:solidFill>
@@ -1993,7 +1996,7 @@
             </a:ln>
             <a:extLst>
               <a:ext uri="{91240B29-F687-4f45-9708-019B960494DF}">
-                <a14:hiddenLine xmlns="" xmlns:a14="http://schemas.microsoft.com/office/drawing/2010/main" w="9525">
+                <a14:hiddenLine xmlns:a14="http://schemas.microsoft.com/office/drawing/2010/main" xmlns="" w="9525">
                   <a:solidFill>
                     <a:srgbClr val="000000"/>
                   </a:solidFill>
@@ -2061,7 +2064,7 @@
             </a:ln>
             <a:extLst>
               <a:ext uri="{91240B29-F687-4f45-9708-019B960494DF}">
-                <a14:hiddenLine xmlns="" xmlns:a14="http://schemas.microsoft.com/office/drawing/2010/main" w="9525">
+                <a14:hiddenLine xmlns:a14="http://schemas.microsoft.com/office/drawing/2010/main" xmlns="" w="9525">
                   <a:solidFill>
                     <a:srgbClr val="000000"/>
                   </a:solidFill>
@@ -2151,7 +2154,7 @@
             </a:ln>
             <a:extLst>
               <a:ext uri="{91240B29-F687-4f45-9708-019B960494DF}">
-                <a14:hiddenLine xmlns="" xmlns:a14="http://schemas.microsoft.com/office/drawing/2010/main" w="9525">
+                <a14:hiddenLine xmlns:a14="http://schemas.microsoft.com/office/drawing/2010/main" xmlns="" w="9525">
                   <a:solidFill>
                     <a:srgbClr val="000000"/>
                   </a:solidFill>
@@ -2219,7 +2222,7 @@
             </a:ln>
             <a:extLst>
               <a:ext uri="{91240B29-F687-4f45-9708-019B960494DF}">
-                <a14:hiddenLine xmlns="" xmlns:a14="http://schemas.microsoft.com/office/drawing/2010/main" w="9525">
+                <a14:hiddenLine xmlns:a14="http://schemas.microsoft.com/office/drawing/2010/main" xmlns="" w="9525">
                   <a:solidFill>
                     <a:srgbClr val="000000"/>
                   </a:solidFill>
@@ -2309,7 +2312,7 @@
             </a:ln>
             <a:extLst>
               <a:ext uri="{91240B29-F687-4f45-9708-019B960494DF}">
-                <a14:hiddenLine xmlns="" xmlns:a14="http://schemas.microsoft.com/office/drawing/2010/main" w="9525">
+                <a14:hiddenLine xmlns:a14="http://schemas.microsoft.com/office/drawing/2010/main" xmlns="" w="9525">
                   <a:solidFill>
                     <a:srgbClr val="000000"/>
                   </a:solidFill>
@@ -2343,7 +2346,7 @@
             </a:ln>
             <a:extLst>
               <a:ext uri="{91240B29-F687-4f45-9708-019B960494DF}">
-                <a14:hiddenLine xmlns="" xmlns:a14="http://schemas.microsoft.com/office/drawing/2010/main" w="9525">
+                <a14:hiddenLine xmlns:a14="http://schemas.microsoft.com/office/drawing/2010/main" xmlns="" w="9525">
                   <a:solidFill>
                     <a:srgbClr val="000000"/>
                   </a:solidFill>
@@ -2433,7 +2436,7 @@
             </a:ln>
             <a:extLst>
               <a:ext uri="{91240B29-F687-4f45-9708-019B960494DF}">
-                <a14:hiddenLine xmlns="" xmlns:a14="http://schemas.microsoft.com/office/drawing/2010/main" w="9525">
+                <a14:hiddenLine xmlns:a14="http://schemas.microsoft.com/office/drawing/2010/main" xmlns="" w="9525">
                   <a:solidFill>
                     <a:srgbClr val="000000"/>
                   </a:solidFill>
@@ -2495,7 +2498,7 @@
             </a:ln>
             <a:extLst>
               <a:ext uri="{91240B29-F687-4f45-9708-019B960494DF}">
-                <a14:hiddenLine xmlns="" xmlns:a14="http://schemas.microsoft.com/office/drawing/2010/main" w="9525">
+                <a14:hiddenLine xmlns:a14="http://schemas.microsoft.com/office/drawing/2010/main" xmlns="" w="9525">
                   <a:solidFill>
                     <a:srgbClr val="000000"/>
                   </a:solidFill>
@@ -2557,7 +2560,7 @@
             </a:ln>
             <a:extLst>
               <a:ext uri="{91240B29-F687-4f45-9708-019B960494DF}">
-                <a14:hiddenLine xmlns="" xmlns:a14="http://schemas.microsoft.com/office/drawing/2010/main" w="9525">
+                <a14:hiddenLine xmlns:a14="http://schemas.microsoft.com/office/drawing/2010/main" xmlns="" w="9525">
                   <a:solidFill>
                     <a:srgbClr val="000000"/>
                   </a:solidFill>
@@ -2647,7 +2650,7 @@
             </a:ln>
             <a:extLst>
               <a:ext uri="{91240B29-F687-4f45-9708-019B960494DF}">
-                <a14:hiddenLine xmlns="" xmlns:a14="http://schemas.microsoft.com/office/drawing/2010/main" w="9525">
+                <a14:hiddenLine xmlns:a14="http://schemas.microsoft.com/office/drawing/2010/main" xmlns="" w="9525">
                   <a:solidFill>
                     <a:srgbClr val="000000"/>
                   </a:solidFill>
@@ -2715,7 +2718,7 @@
             </a:ln>
             <a:extLst>
               <a:ext uri="{91240B29-F687-4f45-9708-019B960494DF}">
-                <a14:hiddenLine xmlns="" xmlns:a14="http://schemas.microsoft.com/office/drawing/2010/main" w="9525">
+                <a14:hiddenLine xmlns:a14="http://schemas.microsoft.com/office/drawing/2010/main" xmlns="" w="9525">
                   <a:solidFill>
                     <a:srgbClr val="000000"/>
                   </a:solidFill>
@@ -2777,7 +2780,7 @@
             </a:ln>
             <a:extLst>
               <a:ext uri="{91240B29-F687-4f45-9708-019B960494DF}">
-                <a14:hiddenLine xmlns="" xmlns:a14="http://schemas.microsoft.com/office/drawing/2010/main" w="9525">
+                <a14:hiddenLine xmlns:a14="http://schemas.microsoft.com/office/drawing/2010/main" xmlns="" w="9525">
                   <a:solidFill>
                     <a:srgbClr val="000000"/>
                   </a:solidFill>
@@ -2867,7 +2870,7 @@
             </a:ln>
             <a:extLst>
               <a:ext uri="{91240B29-F687-4f45-9708-019B960494DF}">
-                <a14:hiddenLine xmlns="" xmlns:a14="http://schemas.microsoft.com/office/drawing/2010/main" w="9525">
+                <a14:hiddenLine xmlns:a14="http://schemas.microsoft.com/office/drawing/2010/main" xmlns="" w="9525">
                   <a:solidFill>
                     <a:srgbClr val="000000"/>
                   </a:solidFill>
@@ -2929,7 +2932,7 @@
             </a:ln>
             <a:extLst>
               <a:ext uri="{91240B29-F687-4f45-9708-019B960494DF}">
-                <a14:hiddenLine xmlns="" xmlns:a14="http://schemas.microsoft.com/office/drawing/2010/main" w="9525">
+                <a14:hiddenLine xmlns:a14="http://schemas.microsoft.com/office/drawing/2010/main" xmlns="" w="9525">
                   <a:solidFill>
                     <a:srgbClr val="000000"/>
                   </a:solidFill>
@@ -3019,7 +3022,7 @@
             </a:ln>
             <a:extLst>
               <a:ext uri="{91240B29-F687-4f45-9708-019B960494DF}">
-                <a14:hiddenLine xmlns="" xmlns:a14="http://schemas.microsoft.com/office/drawing/2010/main" w="9525">
+                <a14:hiddenLine xmlns:a14="http://schemas.microsoft.com/office/drawing/2010/main" xmlns="" w="9525">
                   <a:solidFill>
                     <a:srgbClr val="000000"/>
                   </a:solidFill>
@@ -3081,7 +3084,7 @@
             </a:ln>
             <a:extLst>
               <a:ext uri="{91240B29-F687-4f45-9708-019B960494DF}">
-                <a14:hiddenLine xmlns="" xmlns:a14="http://schemas.microsoft.com/office/drawing/2010/main" w="9525">
+                <a14:hiddenLine xmlns:a14="http://schemas.microsoft.com/office/drawing/2010/main" xmlns="" w="9525">
                   <a:solidFill>
                     <a:srgbClr val="000000"/>
                   </a:solidFill>
@@ -3171,7 +3174,7 @@
             </a:ln>
             <a:extLst>
               <a:ext uri="{91240B29-F687-4f45-9708-019B960494DF}">
-                <a14:hiddenLine xmlns="" xmlns:a14="http://schemas.microsoft.com/office/drawing/2010/main" w="9525">
+                <a14:hiddenLine xmlns:a14="http://schemas.microsoft.com/office/drawing/2010/main" xmlns="" w="9525">
                   <a:solidFill>
                     <a:srgbClr val="000000"/>
                   </a:solidFill>
@@ -3205,7 +3208,7 @@
             </a:ln>
             <a:extLst>
               <a:ext uri="{91240B29-F687-4f45-9708-019B960494DF}">
-                <a14:hiddenLine xmlns="" xmlns:a14="http://schemas.microsoft.com/office/drawing/2010/main" w="9525">
+                <a14:hiddenLine xmlns:a14="http://schemas.microsoft.com/office/drawing/2010/main" xmlns="" w="9525">
                   <a:solidFill>
                     <a:srgbClr val="000000"/>
                   </a:solidFill>
@@ -3270,7 +3273,7 @@
             </a:ln>
             <a:extLst>
               <a:ext uri="{91240B29-F687-4f45-9708-019B960494DF}">
-                <a14:hiddenLine xmlns="" xmlns:a14="http://schemas.microsoft.com/office/drawing/2010/main" w="9525">
+                <a14:hiddenLine xmlns:a14="http://schemas.microsoft.com/office/drawing/2010/main" xmlns="" w="9525">
                   <a:solidFill>
                     <a:srgbClr val="000000"/>
                   </a:solidFill>
@@ -3360,7 +3363,7 @@
             </a:ln>
             <a:extLst>
               <a:ext uri="{91240B29-F687-4f45-9708-019B960494DF}">
-                <a14:hiddenLine xmlns="" xmlns:a14="http://schemas.microsoft.com/office/drawing/2010/main" w="9525">
+                <a14:hiddenLine xmlns:a14="http://schemas.microsoft.com/office/drawing/2010/main" xmlns="" w="9525">
                   <a:solidFill>
                     <a:srgbClr val="000000"/>
                   </a:solidFill>
@@ -3422,7 +3425,7 @@
             </a:ln>
             <a:extLst>
               <a:ext uri="{91240B29-F687-4f45-9708-019B960494DF}">
-                <a14:hiddenLine xmlns="" xmlns:a14="http://schemas.microsoft.com/office/drawing/2010/main" w="9525">
+                <a14:hiddenLine xmlns:a14="http://schemas.microsoft.com/office/drawing/2010/main" xmlns="" w="9525">
                   <a:solidFill>
                     <a:srgbClr val="000000"/>
                   </a:solidFill>
@@ -3512,7 +3515,7 @@
             </a:ln>
             <a:extLst>
               <a:ext uri="{91240B29-F687-4f45-9708-019B960494DF}">
-                <a14:hiddenLine xmlns="" xmlns:a14="http://schemas.microsoft.com/office/drawing/2010/main" w="9525">
+                <a14:hiddenLine xmlns:a14="http://schemas.microsoft.com/office/drawing/2010/main" xmlns="" w="9525">
                   <a:solidFill>
                     <a:srgbClr val="000000"/>
                   </a:solidFill>
@@ -3602,7 +3605,7 @@
             </a:ln>
             <a:extLst>
               <a:ext uri="{91240B29-F687-4f45-9708-019B960494DF}">
-                <a14:hiddenLine xmlns="" xmlns:a14="http://schemas.microsoft.com/office/drawing/2010/main" w="9525">
+                <a14:hiddenLine xmlns:a14="http://schemas.microsoft.com/office/drawing/2010/main" xmlns="" w="9525">
                   <a:solidFill>
                     <a:srgbClr val="000000"/>
                   </a:solidFill>
@@ -3667,7 +3670,7 @@
             </a:ln>
             <a:extLst>
               <a:ext uri="{91240B29-F687-4f45-9708-019B960494DF}">
-                <a14:hiddenLine xmlns="" xmlns:a14="http://schemas.microsoft.com/office/drawing/2010/main" w="9525">
+                <a14:hiddenLine xmlns:a14="http://schemas.microsoft.com/office/drawing/2010/main" xmlns="" w="9525">
                   <a:solidFill>
                     <a:srgbClr val="000000"/>
                   </a:solidFill>
@@ -3729,7 +3732,7 @@
             </a:ln>
             <a:extLst>
               <a:ext uri="{91240B29-F687-4f45-9708-019B960494DF}">
-                <a14:hiddenLine xmlns="" xmlns:a14="http://schemas.microsoft.com/office/drawing/2010/main" w="9525">
+                <a14:hiddenLine xmlns:a14="http://schemas.microsoft.com/office/drawing/2010/main" xmlns="" w="9525">
                   <a:solidFill>
                     <a:srgbClr val="000000"/>
                   </a:solidFill>
@@ -3819,7 +3822,7 @@
             </a:ln>
             <a:extLst>
               <a:ext uri="{91240B29-F687-4f45-9708-019B960494DF}">
-                <a14:hiddenLine xmlns="" xmlns:a14="http://schemas.microsoft.com/office/drawing/2010/main" w="9525">
+                <a14:hiddenLine xmlns:a14="http://schemas.microsoft.com/office/drawing/2010/main" xmlns="" w="9525">
                   <a:solidFill>
                     <a:srgbClr val="000000"/>
                   </a:solidFill>
@@ -3909,7 +3912,7 @@
             </a:ln>
             <a:extLst>
               <a:ext uri="{91240B29-F687-4f45-9708-019B960494DF}">
-                <a14:hiddenLine xmlns="" xmlns:a14="http://schemas.microsoft.com/office/drawing/2010/main" w="9525">
+                <a14:hiddenLine xmlns:a14="http://schemas.microsoft.com/office/drawing/2010/main" xmlns="" w="9525">
                   <a:solidFill>
                     <a:srgbClr val="000000"/>
                   </a:solidFill>
@@ -3971,7 +3974,7 @@
             </a:ln>
             <a:extLst>
               <a:ext uri="{91240B29-F687-4f45-9708-019B960494DF}">
-                <a14:hiddenLine xmlns="" xmlns:a14="http://schemas.microsoft.com/office/drawing/2010/main" w="9525">
+                <a14:hiddenLine xmlns:a14="http://schemas.microsoft.com/office/drawing/2010/main" xmlns="" w="9525">
                   <a:solidFill>
                     <a:srgbClr val="000000"/>
                   </a:solidFill>
@@ -4091,7 +4094,7 @@
             </a:ln>
             <a:extLst>
               <a:ext uri="{91240B29-F687-4f45-9708-019B960494DF}">
-                <a14:hiddenLine xmlns="" xmlns:a14="http://schemas.microsoft.com/office/drawing/2010/main" w="9525">
+                <a14:hiddenLine xmlns:a14="http://schemas.microsoft.com/office/drawing/2010/main" xmlns="" w="9525">
                   <a:solidFill>
                     <a:srgbClr val="000000"/>
                   </a:solidFill>
@@ -4159,7 +4162,7 @@
             </a:ln>
             <a:extLst>
               <a:ext uri="{91240B29-F687-4f45-9708-019B960494DF}">
-                <a14:hiddenLine xmlns="" xmlns:a14="http://schemas.microsoft.com/office/drawing/2010/main" w="9525">
+                <a14:hiddenLine xmlns:a14="http://schemas.microsoft.com/office/drawing/2010/main" xmlns="" w="9525">
                   <a:solidFill>
                     <a:srgbClr val="000000"/>
                   </a:solidFill>
@@ -4249,7 +4252,7 @@
             </a:ln>
             <a:extLst>
               <a:ext uri="{91240B29-F687-4f45-9708-019B960494DF}">
-                <a14:hiddenLine xmlns="" xmlns:a14="http://schemas.microsoft.com/office/drawing/2010/main" w="9525">
+                <a14:hiddenLine xmlns:a14="http://schemas.microsoft.com/office/drawing/2010/main" xmlns="" w="9525">
                   <a:solidFill>
                     <a:srgbClr val="000000"/>
                   </a:solidFill>
@@ -4389,7 +4392,7 @@
           <a:p>
             <a:fld id="{48A87A34-81AB-432B-8DAE-1953F412C126}" type="datetimeFigureOut">
               <a:rPr lang="en-US" dirty="0"/>
-              <a:t>11/14/2016</a:t>
+              <a:t>11/15/2016</a:t>
             </a:fld>
             <a:endParaRPr lang="en-US" dirty="0"/>
           </a:p>
@@ -4651,7 +4654,7 @@
           <a:p>
             <a:fld id="{48A87A34-81AB-432B-8DAE-1953F412C126}" type="datetimeFigureOut">
               <a:rPr lang="en-US" dirty="0"/>
-              <a:t>11/14/2016</a:t>
+              <a:t>11/15/2016</a:t>
             </a:fld>
             <a:endParaRPr lang="en-US" dirty="0"/>
           </a:p>
@@ -4842,7 +4845,7 @@
           <a:p>
             <a:fld id="{48A87A34-81AB-432B-8DAE-1953F412C126}" type="datetimeFigureOut">
               <a:rPr lang="en-US" dirty="0"/>
-              <a:t>11/14/2016</a:t>
+              <a:t>11/15/2016</a:t>
             </a:fld>
             <a:endParaRPr lang="en-US" dirty="0"/>
           </a:p>
@@ -5100,7 +5103,7 @@
           <a:p>
             <a:fld id="{48A87A34-81AB-432B-8DAE-1953F412C126}" type="datetimeFigureOut">
               <a:rPr lang="en-US" dirty="0"/>
-              <a:t>11/14/2016</a:t>
+              <a:t>11/15/2016</a:t>
             </a:fld>
             <a:endParaRPr lang="en-US" dirty="0"/>
           </a:p>
@@ -5529,7 +5532,7 @@
           <a:p>
             <a:fld id="{48A87A34-81AB-432B-8DAE-1953F412C126}" type="datetimeFigureOut">
               <a:rPr lang="en-US" dirty="0"/>
-              <a:t>11/14/2016</a:t>
+              <a:t>11/15/2016</a:t>
             </a:fld>
             <a:endParaRPr lang="en-US" dirty="0"/>
           </a:p>
@@ -6070,7 +6073,7 @@
           <a:p>
             <a:fld id="{48A87A34-81AB-432B-8DAE-1953F412C126}" type="datetimeFigureOut">
               <a:rPr lang="en-US" dirty="0"/>
-              <a:t>11/14/2016</a:t>
+              <a:t>11/15/2016</a:t>
             </a:fld>
             <a:endParaRPr lang="en-US" dirty="0"/>
           </a:p>
@@ -6785,7 +6788,7 @@
           <a:p>
             <a:fld id="{48A87A34-81AB-432B-8DAE-1953F412C126}" type="datetimeFigureOut">
               <a:rPr lang="en-US" dirty="0"/>
-              <a:t>11/14/2016</a:t>
+              <a:t>11/15/2016</a:t>
             </a:fld>
             <a:endParaRPr lang="en-US" dirty="0"/>
           </a:p>
@@ -6950,7 +6953,7 @@
           <a:p>
             <a:fld id="{48A87A34-81AB-432B-8DAE-1953F412C126}" type="datetimeFigureOut">
               <a:rPr lang="en-US" dirty="0"/>
-              <a:t>11/14/2016</a:t>
+              <a:t>11/15/2016</a:t>
             </a:fld>
             <a:endParaRPr lang="en-US" dirty="0"/>
           </a:p>
@@ -7125,7 +7128,7 @@
           <a:p>
             <a:fld id="{48A87A34-81AB-432B-8DAE-1953F412C126}" type="datetimeFigureOut">
               <a:rPr lang="en-US" dirty="0"/>
-              <a:t>11/14/2016</a:t>
+              <a:t>11/15/2016</a:t>
             </a:fld>
             <a:endParaRPr lang="en-US" dirty="0"/>
           </a:p>
@@ -7290,7 +7293,7 @@
           <a:p>
             <a:fld id="{48A87A34-81AB-432B-8DAE-1953F412C126}" type="datetimeFigureOut">
               <a:rPr lang="en-US" dirty="0"/>
-              <a:t>11/14/2016</a:t>
+              <a:t>11/15/2016</a:t>
             </a:fld>
             <a:endParaRPr lang="en-US" dirty="0"/>
           </a:p>
@@ -7535,7 +7538,7 @@
           <a:p>
             <a:fld id="{48A87A34-81AB-432B-8DAE-1953F412C126}" type="datetimeFigureOut">
               <a:rPr lang="en-US" dirty="0"/>
-              <a:t>11/14/2016</a:t>
+              <a:t>11/15/2016</a:t>
             </a:fld>
             <a:endParaRPr lang="en-US" dirty="0"/>
           </a:p>
@@ -7762,7 +7765,7 @@
           <a:p>
             <a:fld id="{48A87A34-81AB-432B-8DAE-1953F412C126}" type="datetimeFigureOut">
               <a:rPr lang="en-US" dirty="0"/>
-              <a:t>11/14/2016</a:t>
+              <a:t>11/15/2016</a:t>
             </a:fld>
             <a:endParaRPr lang="en-US" dirty="0"/>
           </a:p>
@@ -8138,7 +8141,7 @@
           <a:p>
             <a:fld id="{48A87A34-81AB-432B-8DAE-1953F412C126}" type="datetimeFigureOut">
               <a:rPr lang="en-US" dirty="0"/>
-              <a:t>11/14/2016</a:t>
+              <a:t>11/15/2016</a:t>
             </a:fld>
             <a:endParaRPr lang="en-US" dirty="0"/>
           </a:p>
@@ -8251,7 +8254,7 @@
           <a:p>
             <a:fld id="{48A87A34-81AB-432B-8DAE-1953F412C126}" type="datetimeFigureOut">
               <a:rPr lang="en-US" dirty="0"/>
-              <a:t>11/14/2016</a:t>
+              <a:t>11/15/2016</a:t>
             </a:fld>
             <a:endParaRPr lang="en-US" dirty="0"/>
           </a:p>
@@ -8341,7 +8344,7 @@
           <a:p>
             <a:fld id="{48A87A34-81AB-432B-8DAE-1953F412C126}" type="datetimeFigureOut">
               <a:rPr lang="en-US" dirty="0"/>
-              <a:t>11/14/2016</a:t>
+              <a:t>11/15/2016</a:t>
             </a:fld>
             <a:endParaRPr lang="en-US" dirty="0"/>
           </a:p>
@@ -8585,7 +8588,7 @@
           <a:p>
             <a:fld id="{48A87A34-81AB-432B-8DAE-1953F412C126}" type="datetimeFigureOut">
               <a:rPr lang="en-US" dirty="0"/>
-              <a:t>11/14/2016</a:t>
+              <a:t>11/15/2016</a:t>
             </a:fld>
             <a:endParaRPr lang="en-US" dirty="0"/>
           </a:p>
@@ -8860,7 +8863,7 @@
           <a:p>
             <a:fld id="{48A87A34-81AB-432B-8DAE-1953F412C126}" type="datetimeFigureOut">
               <a:rPr lang="en-US" dirty="0"/>
-              <a:t>11/14/2016</a:t>
+              <a:t>11/15/2016</a:t>
             </a:fld>
             <a:endParaRPr lang="en-US" dirty="0"/>
           </a:p>
@@ -8971,7 +8974,7 @@
           <a:noFill/>
           <a:extLst>
             <a:ext uri="{909E8E84-426E-40dd-AFC4-6F175D3DCCD1}">
-              <a14:hiddenFill xmlns="" xmlns:a14="http://schemas.microsoft.com/office/drawing/2010/main">
+              <a14:hiddenFill xmlns:a14="http://schemas.microsoft.com/office/drawing/2010/main" xmlns="">
                 <a:solidFill>
                   <a:srgbClr val="FFFFFF"/>
                 </a:solidFill>
@@ -9045,7 +9048,7 @@
               </a:ln>
               <a:extLst>
                 <a:ext uri="{91240B29-F687-4f45-9708-019B960494DF}">
-                  <a14:hiddenLine xmlns="" xmlns:a14="http://schemas.microsoft.com/office/drawing/2010/main" w="9525">
+                  <a14:hiddenLine xmlns:a14="http://schemas.microsoft.com/office/drawing/2010/main" xmlns="" w="9525">
                     <a:solidFill>
                       <a:srgbClr val="000000"/>
                     </a:solidFill>
@@ -9135,7 +9138,7 @@
               </a:ln>
               <a:extLst>
                 <a:ext uri="{91240B29-F687-4f45-9708-019B960494DF}">
-                  <a14:hiddenLine xmlns="" xmlns:a14="http://schemas.microsoft.com/office/drawing/2010/main" w="9525">
+                  <a14:hiddenLine xmlns:a14="http://schemas.microsoft.com/office/drawing/2010/main" xmlns="" w="9525">
                     <a:solidFill>
                       <a:srgbClr val="000000"/>
                     </a:solidFill>
@@ -9225,7 +9228,7 @@
               </a:ln>
               <a:extLst>
                 <a:ext uri="{91240B29-F687-4f45-9708-019B960494DF}">
-                  <a14:hiddenLine xmlns="" xmlns:a14="http://schemas.microsoft.com/office/drawing/2010/main" w="9525">
+                  <a14:hiddenLine xmlns:a14="http://schemas.microsoft.com/office/drawing/2010/main" xmlns="" w="9525">
                     <a:solidFill>
                       <a:srgbClr val="000000"/>
                     </a:solidFill>
@@ -9287,7 +9290,7 @@
               </a:ln>
               <a:extLst>
                 <a:ext uri="{91240B29-F687-4f45-9708-019B960494DF}">
-                  <a14:hiddenLine xmlns="" xmlns:a14="http://schemas.microsoft.com/office/drawing/2010/main" w="9525">
+                  <a14:hiddenLine xmlns:a14="http://schemas.microsoft.com/office/drawing/2010/main" xmlns="" w="9525">
                     <a:solidFill>
                       <a:srgbClr val="000000"/>
                     </a:solidFill>
@@ -9377,7 +9380,7 @@
               </a:ln>
               <a:extLst>
                 <a:ext uri="{91240B29-F687-4f45-9708-019B960494DF}">
-                  <a14:hiddenLine xmlns="" xmlns:a14="http://schemas.microsoft.com/office/drawing/2010/main" w="9525">
+                  <a14:hiddenLine xmlns:a14="http://schemas.microsoft.com/office/drawing/2010/main" xmlns="" w="9525">
                     <a:solidFill>
                       <a:srgbClr val="000000"/>
                     </a:solidFill>
@@ -9439,7 +9442,7 @@
               </a:ln>
               <a:extLst>
                 <a:ext uri="{91240B29-F687-4f45-9708-019B960494DF}">
-                  <a14:hiddenLine xmlns="" xmlns:a14="http://schemas.microsoft.com/office/drawing/2010/main" w="9525">
+                  <a14:hiddenLine xmlns:a14="http://schemas.microsoft.com/office/drawing/2010/main" xmlns="" w="9525">
                     <a:solidFill>
                       <a:srgbClr val="000000"/>
                     </a:solidFill>
@@ -9501,7 +9504,7 @@
               </a:ln>
               <a:extLst>
                 <a:ext uri="{91240B29-F687-4f45-9708-019B960494DF}">
-                  <a14:hiddenLine xmlns="" xmlns:a14="http://schemas.microsoft.com/office/drawing/2010/main" w="9525">
+                  <a14:hiddenLine xmlns:a14="http://schemas.microsoft.com/office/drawing/2010/main" xmlns="" w="9525">
                     <a:solidFill>
                       <a:srgbClr val="000000"/>
                     </a:solidFill>
@@ -9591,7 +9594,7 @@
               </a:ln>
               <a:extLst>
                 <a:ext uri="{91240B29-F687-4f45-9708-019B960494DF}">
-                  <a14:hiddenLine xmlns="" xmlns:a14="http://schemas.microsoft.com/office/drawing/2010/main" w="9525">
+                  <a14:hiddenLine xmlns:a14="http://schemas.microsoft.com/office/drawing/2010/main" xmlns="" w="9525">
                     <a:solidFill>
                       <a:srgbClr val="000000"/>
                     </a:solidFill>
@@ -9681,7 +9684,7 @@
               </a:ln>
               <a:extLst>
                 <a:ext uri="{91240B29-F687-4f45-9708-019B960494DF}">
-                  <a14:hiddenLine xmlns="" xmlns:a14="http://schemas.microsoft.com/office/drawing/2010/main" w="9525">
+                  <a14:hiddenLine xmlns:a14="http://schemas.microsoft.com/office/drawing/2010/main" xmlns="" w="9525">
                     <a:solidFill>
                       <a:srgbClr val="000000"/>
                     </a:solidFill>
@@ -9743,7 +9746,7 @@
               </a:ln>
               <a:extLst>
                 <a:ext uri="{91240B29-F687-4f45-9708-019B960494DF}">
-                  <a14:hiddenLine xmlns="" xmlns:a14="http://schemas.microsoft.com/office/drawing/2010/main" w="9525">
+                  <a14:hiddenLine xmlns:a14="http://schemas.microsoft.com/office/drawing/2010/main" xmlns="" w="9525">
                     <a:solidFill>
                       <a:srgbClr val="000000"/>
                     </a:solidFill>
@@ -9853,7 +9856,7 @@
               </a:ln>
               <a:extLst>
                 <a:ext uri="{91240B29-F687-4f45-9708-019B960494DF}">
-                  <a14:hiddenLine xmlns="" xmlns:a14="http://schemas.microsoft.com/office/drawing/2010/main" w="9525">
+                  <a14:hiddenLine xmlns:a14="http://schemas.microsoft.com/office/drawing/2010/main" xmlns="" w="9525">
                     <a:solidFill>
                       <a:srgbClr val="000000"/>
                     </a:solidFill>
@@ -9937,7 +9940,7 @@
               </a:ln>
               <a:extLst>
                 <a:ext uri="{91240B29-F687-4f45-9708-019B960494DF}">
-                  <a14:hiddenLine xmlns="" xmlns:a14="http://schemas.microsoft.com/office/drawing/2010/main" w="9525">
+                  <a14:hiddenLine xmlns:a14="http://schemas.microsoft.com/office/drawing/2010/main" xmlns="" w="9525">
                     <a:solidFill>
                       <a:srgbClr val="000000"/>
                     </a:solidFill>
@@ -9999,7 +10002,7 @@
               </a:ln>
               <a:extLst>
                 <a:ext uri="{91240B29-F687-4f45-9708-019B960494DF}">
-                  <a14:hiddenLine xmlns="" xmlns:a14="http://schemas.microsoft.com/office/drawing/2010/main" w="9525">
+                  <a14:hiddenLine xmlns:a14="http://schemas.microsoft.com/office/drawing/2010/main" xmlns="" w="9525">
                     <a:solidFill>
                       <a:srgbClr val="000000"/>
                     </a:solidFill>
@@ -10061,7 +10064,7 @@
               </a:ln>
               <a:extLst>
                 <a:ext uri="{91240B29-F687-4f45-9708-019B960494DF}">
-                  <a14:hiddenLine xmlns="" xmlns:a14="http://schemas.microsoft.com/office/drawing/2010/main" w="9525">
+                  <a14:hiddenLine xmlns:a14="http://schemas.microsoft.com/office/drawing/2010/main" xmlns="" w="9525">
                     <a:solidFill>
                       <a:srgbClr val="000000"/>
                     </a:solidFill>
@@ -10151,7 +10154,7 @@
               </a:ln>
               <a:extLst>
                 <a:ext uri="{91240B29-F687-4f45-9708-019B960494DF}">
-                  <a14:hiddenLine xmlns="" xmlns:a14="http://schemas.microsoft.com/office/drawing/2010/main" w="9525">
+                  <a14:hiddenLine xmlns:a14="http://schemas.microsoft.com/office/drawing/2010/main" xmlns="" w="9525">
                     <a:solidFill>
                       <a:srgbClr val="000000"/>
                     </a:solidFill>
@@ -10185,7 +10188,7 @@
               </a:ln>
               <a:extLst>
                 <a:ext uri="{91240B29-F687-4f45-9708-019B960494DF}">
-                  <a14:hiddenLine xmlns="" xmlns:a14="http://schemas.microsoft.com/office/drawing/2010/main" w="9525">
+                  <a14:hiddenLine xmlns:a14="http://schemas.microsoft.com/office/drawing/2010/main" xmlns="" w="9525">
                     <a:solidFill>
                       <a:srgbClr val="000000"/>
                     </a:solidFill>
@@ -10250,7 +10253,7 @@
               </a:ln>
               <a:extLst>
                 <a:ext uri="{91240B29-F687-4f45-9708-019B960494DF}">
-                  <a14:hiddenLine xmlns="" xmlns:a14="http://schemas.microsoft.com/office/drawing/2010/main" w="9525">
+                  <a14:hiddenLine xmlns:a14="http://schemas.microsoft.com/office/drawing/2010/main" xmlns="" w="9525">
                     <a:solidFill>
                       <a:srgbClr val="000000"/>
                     </a:solidFill>
@@ -10340,7 +10343,7 @@
               </a:ln>
               <a:extLst>
                 <a:ext uri="{91240B29-F687-4f45-9708-019B960494DF}">
-                  <a14:hiddenLine xmlns="" xmlns:a14="http://schemas.microsoft.com/office/drawing/2010/main" w="9525">
+                  <a14:hiddenLine xmlns:a14="http://schemas.microsoft.com/office/drawing/2010/main" xmlns="" w="9525">
                     <a:solidFill>
                       <a:srgbClr val="000000"/>
                     </a:solidFill>
@@ -10402,7 +10405,7 @@
               </a:ln>
               <a:extLst>
                 <a:ext uri="{91240B29-F687-4f45-9708-019B960494DF}">
-                  <a14:hiddenLine xmlns="" xmlns:a14="http://schemas.microsoft.com/office/drawing/2010/main" w="9525">
+                  <a14:hiddenLine xmlns:a14="http://schemas.microsoft.com/office/drawing/2010/main" xmlns="" w="9525">
                     <a:solidFill>
                       <a:srgbClr val="000000"/>
                     </a:solidFill>
@@ -10492,7 +10495,7 @@
               </a:ln>
               <a:extLst>
                 <a:ext uri="{91240B29-F687-4f45-9708-019B960494DF}">
-                  <a14:hiddenLine xmlns="" xmlns:a14="http://schemas.microsoft.com/office/drawing/2010/main" w="9525">
+                  <a14:hiddenLine xmlns:a14="http://schemas.microsoft.com/office/drawing/2010/main" xmlns="" w="9525">
                     <a:solidFill>
                       <a:srgbClr val="000000"/>
                     </a:solidFill>
@@ -10557,7 +10560,7 @@
               </a:ln>
               <a:extLst>
                 <a:ext uri="{91240B29-F687-4f45-9708-019B960494DF}">
-                  <a14:hiddenLine xmlns="" xmlns:a14="http://schemas.microsoft.com/office/drawing/2010/main" w="9525">
+                  <a14:hiddenLine xmlns:a14="http://schemas.microsoft.com/office/drawing/2010/main" xmlns="" w="9525">
                     <a:solidFill>
                       <a:srgbClr val="000000"/>
                     </a:solidFill>
@@ -10619,7 +10622,7 @@
               </a:ln>
               <a:extLst>
                 <a:ext uri="{91240B29-F687-4f45-9708-019B960494DF}">
-                  <a14:hiddenLine xmlns="" xmlns:a14="http://schemas.microsoft.com/office/drawing/2010/main" w="9525">
+                  <a14:hiddenLine xmlns:a14="http://schemas.microsoft.com/office/drawing/2010/main" xmlns="" w="9525">
                     <a:solidFill>
                       <a:srgbClr val="000000"/>
                     </a:solidFill>
@@ -10709,7 +10712,7 @@
               </a:ln>
               <a:extLst>
                 <a:ext uri="{91240B29-F687-4f45-9708-019B960494DF}">
-                  <a14:hiddenLine xmlns="" xmlns:a14="http://schemas.microsoft.com/office/drawing/2010/main" w="9525">
+                  <a14:hiddenLine xmlns:a14="http://schemas.microsoft.com/office/drawing/2010/main" xmlns="" w="9525">
                     <a:solidFill>
                       <a:srgbClr val="000000"/>
                     </a:solidFill>
@@ -10799,7 +10802,7 @@
               </a:ln>
               <a:extLst>
                 <a:ext uri="{91240B29-F687-4f45-9708-019B960494DF}">
-                  <a14:hiddenLine xmlns="" xmlns:a14="http://schemas.microsoft.com/office/drawing/2010/main" w="9525">
+                  <a14:hiddenLine xmlns:a14="http://schemas.microsoft.com/office/drawing/2010/main" xmlns="" w="9525">
                     <a:solidFill>
                       <a:srgbClr val="000000"/>
                     </a:solidFill>
@@ -10864,7 +10867,7 @@
               </a:ln>
               <a:extLst>
                 <a:ext uri="{91240B29-F687-4f45-9708-019B960494DF}">
-                  <a14:hiddenLine xmlns="" xmlns:a14="http://schemas.microsoft.com/office/drawing/2010/main" w="9525">
+                  <a14:hiddenLine xmlns:a14="http://schemas.microsoft.com/office/drawing/2010/main" xmlns="" w="9525">
                     <a:solidFill>
                       <a:srgbClr val="000000"/>
                     </a:solidFill>
@@ -10984,7 +10987,7 @@
               </a:ln>
               <a:extLst>
                 <a:ext uri="{91240B29-F687-4f45-9708-019B960494DF}">
-                  <a14:hiddenLine xmlns="" xmlns:a14="http://schemas.microsoft.com/office/drawing/2010/main" w="9525">
+                  <a14:hiddenLine xmlns:a14="http://schemas.microsoft.com/office/drawing/2010/main" xmlns="" w="9525">
                     <a:solidFill>
                       <a:srgbClr val="000000"/>
                     </a:solidFill>
@@ -11082,7 +11085,7 @@
               </a:ln>
               <a:extLst>
                 <a:ext uri="{91240B29-F687-4f45-9708-019B960494DF}">
-                  <a14:hiddenLine xmlns="" xmlns:a14="http://schemas.microsoft.com/office/drawing/2010/main" w="9525">
+                  <a14:hiddenLine xmlns:a14="http://schemas.microsoft.com/office/drawing/2010/main" xmlns="" w="9525">
                     <a:solidFill>
                       <a:srgbClr val="000000"/>
                     </a:solidFill>
@@ -11197,7 +11200,7 @@
               </a:ln>
               <a:extLst>
                 <a:ext uri="{91240B29-F687-4f45-9708-019B960494DF}">
-                  <a14:hiddenLine xmlns="" xmlns:a14="http://schemas.microsoft.com/office/drawing/2010/main" w="9525">
+                  <a14:hiddenLine xmlns:a14="http://schemas.microsoft.com/office/drawing/2010/main" xmlns="" w="9525">
                     <a:solidFill>
                       <a:srgbClr val="000000"/>
                     </a:solidFill>
@@ -11287,7 +11290,7 @@
               </a:ln>
               <a:extLst>
                 <a:ext uri="{91240B29-F687-4f45-9708-019B960494DF}">
-                  <a14:hiddenLine xmlns="" xmlns:a14="http://schemas.microsoft.com/office/drawing/2010/main" w="9525">
+                  <a14:hiddenLine xmlns:a14="http://schemas.microsoft.com/office/drawing/2010/main" xmlns="" w="9525">
                     <a:solidFill>
                       <a:srgbClr val="000000"/>
                     </a:solidFill>
@@ -11352,7 +11355,7 @@
               </a:ln>
               <a:extLst>
                 <a:ext uri="{91240B29-F687-4f45-9708-019B960494DF}">
-                  <a14:hiddenLine xmlns="" xmlns:a14="http://schemas.microsoft.com/office/drawing/2010/main" w="9525">
+                  <a14:hiddenLine xmlns:a14="http://schemas.microsoft.com/office/drawing/2010/main" xmlns="" w="9525">
                     <a:solidFill>
                       <a:srgbClr val="000000"/>
                     </a:solidFill>
@@ -11442,7 +11445,7 @@
               </a:ln>
               <a:extLst>
                 <a:ext uri="{91240B29-F687-4f45-9708-019B960494DF}">
-                  <a14:hiddenLine xmlns="" xmlns:a14="http://schemas.microsoft.com/office/drawing/2010/main" w="9525">
+                  <a14:hiddenLine xmlns:a14="http://schemas.microsoft.com/office/drawing/2010/main" xmlns="" w="9525">
                     <a:solidFill>
                       <a:srgbClr val="000000"/>
                     </a:solidFill>
@@ -11510,7 +11513,7 @@
               </a:ln>
               <a:extLst>
                 <a:ext uri="{91240B29-F687-4f45-9708-019B960494DF}">
-                  <a14:hiddenLine xmlns="" xmlns:a14="http://schemas.microsoft.com/office/drawing/2010/main" w="9525">
+                  <a14:hiddenLine xmlns:a14="http://schemas.microsoft.com/office/drawing/2010/main" xmlns="" w="9525">
                     <a:solidFill>
                       <a:srgbClr val="000000"/>
                     </a:solidFill>
@@ -11600,7 +11603,7 @@
               </a:ln>
               <a:extLst>
                 <a:ext uri="{91240B29-F687-4f45-9708-019B960494DF}">
-                  <a14:hiddenLine xmlns="" xmlns:a14="http://schemas.microsoft.com/office/drawing/2010/main" w="9525">
+                  <a14:hiddenLine xmlns:a14="http://schemas.microsoft.com/office/drawing/2010/main" xmlns="" w="9525">
                     <a:solidFill>
                       <a:srgbClr val="000000"/>
                     </a:solidFill>
@@ -11668,7 +11671,7 @@
               </a:ln>
               <a:extLst>
                 <a:ext uri="{91240B29-F687-4f45-9708-019B960494DF}">
-                  <a14:hiddenLine xmlns="" xmlns:a14="http://schemas.microsoft.com/office/drawing/2010/main" w="9525">
+                  <a14:hiddenLine xmlns:a14="http://schemas.microsoft.com/office/drawing/2010/main" xmlns="" w="9525">
                     <a:solidFill>
                       <a:srgbClr val="000000"/>
                     </a:solidFill>
@@ -11758,7 +11761,7 @@
               </a:ln>
               <a:extLst>
                 <a:ext uri="{91240B29-F687-4f45-9708-019B960494DF}">
-                  <a14:hiddenLine xmlns="" xmlns:a14="http://schemas.microsoft.com/office/drawing/2010/main" w="9525">
+                  <a14:hiddenLine xmlns:a14="http://schemas.microsoft.com/office/drawing/2010/main" xmlns="" w="9525">
                     <a:solidFill>
                       <a:srgbClr val="000000"/>
                     </a:solidFill>
@@ -11792,7 +11795,7 @@
               </a:ln>
               <a:extLst>
                 <a:ext uri="{91240B29-F687-4f45-9708-019B960494DF}">
-                  <a14:hiddenLine xmlns="" xmlns:a14="http://schemas.microsoft.com/office/drawing/2010/main" w="9525">
+                  <a14:hiddenLine xmlns:a14="http://schemas.microsoft.com/office/drawing/2010/main" xmlns="" w="9525">
                     <a:solidFill>
                       <a:srgbClr val="000000"/>
                     </a:solidFill>
@@ -11933,7 +11936,7 @@
             <a:fld id="{48A87A34-81AB-432B-8DAE-1953F412C126}" type="datetimeFigureOut">
               <a:rPr lang="en-US" dirty="0"/>
               <a:pPr/>
-              <a:t>11/14/2016</a:t>
+              <a:t>11/15/2016</a:t>
             </a:fld>
             <a:endParaRPr lang="en-US" dirty="0"/>
           </a:p>
@@ -12434,6 +12437,18 @@
   <p:clrMapOvr>
     <a:masterClrMapping/>
   </p:clrMapOvr>
+  <mc:AlternateContent xmlns:mc="http://schemas.openxmlformats.org/markup-compatibility/2006">
+    <mc:Choice xmlns:p14="http://schemas.microsoft.com/office/powerpoint/2010/main" Requires="p14">
+      <p:transition spd="slow" p14:dur="3000">
+        <p14:shred/>
+      </p:transition>
+    </mc:Choice>
+    <mc:Fallback>
+      <p:transition spd="slow">
+        <p:fade/>
+      </p:transition>
+    </mc:Fallback>
+  </mc:AlternateContent>
 </p:sld>
 </file>
 
@@ -12543,6 +12558,364 @@
   <p:clrMapOvr>
     <a:masterClrMapping/>
   </p:clrMapOvr>
+  <mc:AlternateContent xmlns:mc="http://schemas.openxmlformats.org/markup-compatibility/2006">
+    <mc:Choice xmlns:p14="http://schemas.microsoft.com/office/powerpoint/2010/main" Requires="p14">
+      <p:transition spd="slow" p14:dur="3000">
+        <p14:shred/>
+      </p:transition>
+    </mc:Choice>
+    <mc:Fallback>
+      <p:transition spd="slow">
+        <p:fade/>
+      </p:transition>
+    </mc:Fallback>
+  </mc:AlternateContent>
+</p:sld>
+</file>
+
+<file path=ppt/slides/slide3.xml><?xml version="1.0" encoding="utf-8"?>
+<p:sld xmlns:a="http://schemas.openxmlformats.org/drawingml/2006/main" xmlns:r="http://schemas.openxmlformats.org/officeDocument/2006/relationships" xmlns:p="http://schemas.openxmlformats.org/presentationml/2006/main">
+  <p:cSld>
+    <p:spTree>
+      <p:nvGrpSpPr>
+        <p:cNvPr id="1" name=""/>
+        <p:cNvGrpSpPr/>
+        <p:nvPr/>
+      </p:nvGrpSpPr>
+      <p:grpSpPr>
+        <a:xfrm>
+          <a:off x="0" y="0"/>
+          <a:ext cx="0" cy="0"/>
+          <a:chOff x="0" y="0"/>
+          <a:chExt cx="0" cy="0"/>
+        </a:xfrm>
+      </p:grpSpPr>
+      <p:sp>
+        <p:nvSpPr>
+          <p:cNvPr id="2" name="Titre 1"/>
+          <p:cNvSpPr>
+            <a:spLocks noGrp="1"/>
+          </p:cNvSpPr>
+          <p:nvPr>
+            <p:ph type="title"/>
+          </p:nvPr>
+        </p:nvSpPr>
+        <p:spPr/>
+        <p:txBody>
+          <a:bodyPr/>
+          <a:lstStyle/>
+          <a:p>
+            <a:r>
+              <a:rPr lang="fr-FR" dirty="0"/>
+              <a:t>Résultat des expériences menées</a:t>
+            </a:r>
+          </a:p>
+        </p:txBody>
+      </p:sp>
+      <p:pic>
+        <p:nvPicPr>
+          <p:cNvPr id="4" name="Espace réservé du contenu 3"/>
+          <p:cNvPicPr>
+            <a:picLocks noGrp="1" noChangeAspect="1"/>
+          </p:cNvPicPr>
+          <p:nvPr>
+            <p:ph idx="1"/>
+          </p:nvPr>
+        </p:nvPicPr>
+        <p:blipFill>
+          <a:blip r:embed="rId2"/>
+          <a:stretch>
+            <a:fillRect/>
+          </a:stretch>
+        </p:blipFill>
+        <p:spPr>
+          <a:xfrm>
+            <a:off x="562558" y="2278617"/>
+            <a:ext cx="5685714" cy="2409524"/>
+          </a:xfrm>
+          <a:prstGeom prst="rect">
+            <a:avLst/>
+          </a:prstGeom>
+        </p:spPr>
+      </p:pic>
+      <p:pic>
+        <p:nvPicPr>
+          <p:cNvPr id="1026" name="Picture 2" descr="final graft result"/>
+          <p:cNvPicPr>
+            <a:picLocks noChangeAspect="1" noChangeArrowheads="1"/>
+          </p:cNvPicPr>
+          <p:nvPr/>
+        </p:nvPicPr>
+        <p:blipFill>
+          <a:blip r:embed="rId3">
+            <a:extLst>
+              <a:ext uri="{28A0092B-C50C-407E-A947-70E740481C1C}">
+                <a14:useLocalDpi xmlns:a14="http://schemas.microsoft.com/office/drawing/2010/main" val="0"/>
+              </a:ext>
+            </a:extLst>
+          </a:blip>
+          <a:srcRect/>
+          <a:stretch>
+            <a:fillRect/>
+          </a:stretch>
+        </p:blipFill>
+        <p:spPr bwMode="auto">
+          <a:xfrm>
+            <a:off x="6383549" y="1912530"/>
+            <a:ext cx="4528585" cy="3402072"/>
+          </a:xfrm>
+          <a:prstGeom prst="rect">
+            <a:avLst/>
+          </a:prstGeom>
+          <a:noFill/>
+          <a:ln>
+            <a:noFill/>
+          </a:ln>
+          <a:extLst>
+            <a:ext uri="{909E8E84-426E-40DD-AFC4-6F175D3DCCD1}">
+              <a14:hiddenFill xmlns:a14="http://schemas.microsoft.com/office/drawing/2010/main">
+                <a:solidFill>
+                  <a:srgbClr val="FFFFFF"/>
+                </a:solidFill>
+              </a14:hiddenFill>
+            </a:ext>
+            <a:ext uri="{91240B29-F687-4F45-9708-019B960494DF}">
+              <a14:hiddenLine xmlns:a14="http://schemas.microsoft.com/office/drawing/2010/main" w="9525">
+                <a:solidFill>
+                  <a:srgbClr val="000000"/>
+                </a:solidFill>
+                <a:miter lim="800000"/>
+                <a:headEnd/>
+                <a:tailEnd/>
+              </a14:hiddenLine>
+            </a:ext>
+          </a:extLst>
+        </p:spPr>
+      </p:pic>
+    </p:spTree>
+    <p:extLst>
+      <p:ext uri="{BB962C8B-B14F-4D97-AF65-F5344CB8AC3E}">
+        <p14:creationId xmlns:p14="http://schemas.microsoft.com/office/powerpoint/2010/main" val="233982723"/>
+      </p:ext>
+    </p:extLst>
+  </p:cSld>
+  <p:clrMapOvr>
+    <a:masterClrMapping/>
+  </p:clrMapOvr>
+  <mc:AlternateContent xmlns:mc="http://schemas.openxmlformats.org/markup-compatibility/2006">
+    <mc:Choice xmlns:p14="http://schemas.microsoft.com/office/powerpoint/2010/main" Requires="p14">
+      <p:transition spd="slow" p14:dur="3000">
+        <p14:shred/>
+      </p:transition>
+    </mc:Choice>
+    <mc:Fallback>
+      <p:transition spd="slow">
+        <p:fade/>
+      </p:transition>
+    </mc:Fallback>
+  </mc:AlternateContent>
+</p:sld>
+</file>
+
+<file path=ppt/slides/slide4.xml><?xml version="1.0" encoding="utf-8"?>
+<p:sld xmlns:a="http://schemas.openxmlformats.org/drawingml/2006/main" xmlns:r="http://schemas.openxmlformats.org/officeDocument/2006/relationships" xmlns:p="http://schemas.openxmlformats.org/presentationml/2006/main">
+  <p:cSld>
+    <p:spTree>
+      <p:nvGrpSpPr>
+        <p:cNvPr id="1" name=""/>
+        <p:cNvGrpSpPr/>
+        <p:nvPr/>
+      </p:nvGrpSpPr>
+      <p:grpSpPr>
+        <a:xfrm>
+          <a:off x="0" y="0"/>
+          <a:ext cx="0" cy="0"/>
+          <a:chOff x="0" y="0"/>
+          <a:chExt cx="0" cy="0"/>
+        </a:xfrm>
+      </p:grpSpPr>
+      <p:sp>
+        <p:nvSpPr>
+          <p:cNvPr id="2" name="Titre 1"/>
+          <p:cNvSpPr>
+            <a:spLocks noGrp="1"/>
+          </p:cNvSpPr>
+          <p:nvPr>
+            <p:ph type="title"/>
+          </p:nvPr>
+        </p:nvSpPr>
+        <p:spPr/>
+        <p:txBody>
+          <a:bodyPr/>
+          <a:lstStyle/>
+          <a:p>
+            <a:r>
+              <a:rPr lang="fr-FR" dirty="0"/>
+              <a:t>Explication du fonctionnement du circuit et capteur</a:t>
+            </a:r>
+          </a:p>
+        </p:txBody>
+      </p:sp>
+      <p:pic>
+        <p:nvPicPr>
+          <p:cNvPr id="4" name="Espace réservé du contenu 3"/>
+          <p:cNvPicPr>
+            <a:picLocks noGrp="1" noChangeAspect="1"/>
+          </p:cNvPicPr>
+          <p:nvPr>
+            <p:ph idx="1"/>
+          </p:nvPr>
+        </p:nvPicPr>
+        <p:blipFill>
+          <a:blip r:embed="rId2"/>
+          <a:stretch>
+            <a:fillRect/>
+          </a:stretch>
+        </p:blipFill>
+        <p:spPr>
+          <a:xfrm>
+            <a:off x="2879625" y="2097088"/>
+            <a:ext cx="6429573" cy="4448690"/>
+          </a:xfrm>
+          <a:prstGeom prst="rect">
+            <a:avLst/>
+          </a:prstGeom>
+        </p:spPr>
+      </p:pic>
+    </p:spTree>
+    <p:extLst>
+      <p:ext uri="{BB962C8B-B14F-4D97-AF65-F5344CB8AC3E}">
+        <p14:creationId xmlns:p14="http://schemas.microsoft.com/office/powerpoint/2010/main" val="1174212689"/>
+      </p:ext>
+    </p:extLst>
+  </p:cSld>
+  <p:clrMapOvr>
+    <a:masterClrMapping/>
+  </p:clrMapOvr>
+  <mc:AlternateContent xmlns:mc="http://schemas.openxmlformats.org/markup-compatibility/2006">
+    <mc:Choice xmlns:p14="http://schemas.microsoft.com/office/powerpoint/2010/main" Requires="p14">
+      <p:transition spd="slow" p14:dur="3000">
+        <p14:shred/>
+      </p:transition>
+    </mc:Choice>
+    <mc:Fallback>
+      <p:transition spd="slow">
+        <p:fade/>
+      </p:transition>
+    </mc:Fallback>
+  </mc:AlternateContent>
+</p:sld>
+</file>
+
+<file path=ppt/slides/slide5.xml><?xml version="1.0" encoding="utf-8"?>
+<p:sld xmlns:a="http://schemas.openxmlformats.org/drawingml/2006/main" xmlns:r="http://schemas.openxmlformats.org/officeDocument/2006/relationships" xmlns:p="http://schemas.openxmlformats.org/presentationml/2006/main">
+  <p:cSld>
+    <p:spTree>
+      <p:nvGrpSpPr>
+        <p:cNvPr id="1" name=""/>
+        <p:cNvGrpSpPr/>
+        <p:nvPr/>
+      </p:nvGrpSpPr>
+      <p:grpSpPr>
+        <a:xfrm>
+          <a:off x="0" y="0"/>
+          <a:ext cx="0" cy="0"/>
+          <a:chOff x="0" y="0"/>
+          <a:chExt cx="0" cy="0"/>
+        </a:xfrm>
+      </p:grpSpPr>
+      <p:sp>
+        <p:nvSpPr>
+          <p:cNvPr id="2" name="Titre 1"/>
+          <p:cNvSpPr>
+            <a:spLocks noGrp="1"/>
+          </p:cNvSpPr>
+          <p:nvPr>
+            <p:ph type="title"/>
+          </p:nvPr>
+        </p:nvSpPr>
+        <p:spPr/>
+        <p:txBody>
+          <a:bodyPr/>
+          <a:lstStyle/>
+          <a:p>
+            <a:r>
+              <a:rPr lang="fr-FR" dirty="0"/>
+              <a:t>Bilan du projet</a:t>
+            </a:r>
+          </a:p>
+        </p:txBody>
+      </p:sp>
+      <p:sp>
+        <p:nvSpPr>
+          <p:cNvPr id="3" name="Espace réservé du contenu 2"/>
+          <p:cNvSpPr>
+            <a:spLocks noGrp="1"/>
+          </p:cNvSpPr>
+          <p:nvPr>
+            <p:ph idx="1"/>
+          </p:nvPr>
+        </p:nvSpPr>
+        <p:spPr/>
+        <p:txBody>
+          <a:bodyPr/>
+          <a:lstStyle/>
+          <a:p>
+            <a:r>
+              <a:rPr lang="fr-FR" dirty="0"/>
+              <a:t>La réalisation du prototype.</a:t>
+            </a:r>
+          </a:p>
+          <a:p>
+            <a:r>
+              <a:rPr lang="fr-FR" dirty="0"/>
+              <a:t>Les améliorations</a:t>
+            </a:r>
+            <a:r>
+              <a:rPr lang="fr-FR" dirty="0"/>
+              <a:t> possible</a:t>
+            </a:r>
+            <a:r>
+              <a:rPr lang="fr-FR" dirty="0"/>
+              <a:t>.</a:t>
+            </a:r>
+          </a:p>
+          <a:p>
+            <a:r>
+              <a:rPr lang="fr-FR" dirty="0"/>
+              <a:t>Les contraintes rencontrées.</a:t>
+            </a:r>
+          </a:p>
+          <a:p>
+            <a:r>
+              <a:rPr lang="fr-FR" dirty="0"/>
+              <a:t>Conclusion général. </a:t>
+            </a:r>
+          </a:p>
+        </p:txBody>
+      </p:sp>
+    </p:spTree>
+    <p:extLst>
+      <p:ext uri="{BB962C8B-B14F-4D97-AF65-F5344CB8AC3E}">
+        <p14:creationId xmlns:p14="http://schemas.microsoft.com/office/powerpoint/2010/main" val="2463793308"/>
+      </p:ext>
+    </p:extLst>
+  </p:cSld>
+  <p:clrMapOvr>
+    <a:masterClrMapping/>
+  </p:clrMapOvr>
+  <mc:AlternateContent xmlns:mc="http://schemas.openxmlformats.org/markup-compatibility/2006">
+    <mc:Choice xmlns:p14="http://schemas.microsoft.com/office/powerpoint/2010/main" Requires="p14">
+      <p:transition spd="slow" p14:dur="3000">
+        <p14:shred/>
+      </p:transition>
+    </mc:Choice>
+    <mc:Fallback>
+      <p:transition spd="slow">
+        <p:fade/>
+      </p:transition>
+    </mc:Fallback>
+  </mc:AlternateContent>
 </p:sld>
 </file>
 

</xml_diff>

<commit_message>
maj de ce matin
</commit_message>
<xml_diff>
--- a/Projet smart-patate.pptx
+++ b/Projet smart-patate.pptx
@@ -4,12 +4,16 @@
   <p:sldMasterIdLst>
     <p:sldMasterId id="2147483648" r:id="rId1"/>
   </p:sldMasterIdLst>
+  <p:notesMasterIdLst>
+    <p:notesMasterId r:id="rId8"/>
+  </p:notesMasterIdLst>
   <p:sldIdLst>
     <p:sldId id="256" r:id="rId2"/>
     <p:sldId id="257" r:id="rId3"/>
     <p:sldId id="258" r:id="rId4"/>
     <p:sldId id="259" r:id="rId5"/>
     <p:sldId id="260" r:id="rId6"/>
+    <p:sldId id="261" r:id="rId7"/>
   </p:sldIdLst>
   <p:sldSz cx="12192000" cy="6858000"/>
   <p:notesSz cx="6858000" cy="9144000"/>
@@ -114,6 +118,773 @@
     </p:ext>
   </p:extLst>
 </p:presentation>
+</file>
+
+<file path=ppt/notesMasters/notesMaster1.xml><?xml version="1.0" encoding="utf-8"?>
+<p:notesMaster xmlns:a="http://schemas.openxmlformats.org/drawingml/2006/main" xmlns:r="http://schemas.openxmlformats.org/officeDocument/2006/relationships" xmlns:p="http://schemas.openxmlformats.org/presentationml/2006/main">
+  <p:cSld>
+    <p:bg>
+      <p:bgRef idx="1001">
+        <a:schemeClr val="bg1"/>
+      </p:bgRef>
+    </p:bg>
+    <p:spTree>
+      <p:nvGrpSpPr>
+        <p:cNvPr id="1" name=""/>
+        <p:cNvGrpSpPr/>
+        <p:nvPr/>
+      </p:nvGrpSpPr>
+      <p:grpSpPr>
+        <a:xfrm>
+          <a:off x="0" y="0"/>
+          <a:ext cx="0" cy="0"/>
+          <a:chOff x="0" y="0"/>
+          <a:chExt cx="0" cy="0"/>
+        </a:xfrm>
+      </p:grpSpPr>
+      <p:sp>
+        <p:nvSpPr>
+          <p:cNvPr id="2" name="Espace réservé de l'en-tête 1"/>
+          <p:cNvSpPr>
+            <a:spLocks noGrp="1"/>
+          </p:cNvSpPr>
+          <p:nvPr>
+            <p:ph type="hdr" sz="quarter"/>
+          </p:nvPr>
+        </p:nvSpPr>
+        <p:spPr>
+          <a:xfrm>
+            <a:off x="0" y="0"/>
+            <a:ext cx="2971800" cy="458788"/>
+          </a:xfrm>
+          <a:prstGeom prst="rect">
+            <a:avLst/>
+          </a:prstGeom>
+        </p:spPr>
+        <p:txBody>
+          <a:bodyPr vert="horz" lIns="91440" tIns="45720" rIns="91440" bIns="45720" rtlCol="0"/>
+          <a:lstStyle>
+            <a:lvl1pPr algn="l">
+              <a:defRPr sz="1200"/>
+            </a:lvl1pPr>
+          </a:lstStyle>
+          <a:p>
+            <a:endParaRPr lang="fr-FR"/>
+          </a:p>
+        </p:txBody>
+      </p:sp>
+      <p:sp>
+        <p:nvSpPr>
+          <p:cNvPr id="3" name="Espace réservé de la date 2"/>
+          <p:cNvSpPr>
+            <a:spLocks noGrp="1"/>
+          </p:cNvSpPr>
+          <p:nvPr>
+            <p:ph type="dt" idx="1"/>
+          </p:nvPr>
+        </p:nvSpPr>
+        <p:spPr>
+          <a:xfrm>
+            <a:off x="3884613" y="0"/>
+            <a:ext cx="2971800" cy="458788"/>
+          </a:xfrm>
+          <a:prstGeom prst="rect">
+            <a:avLst/>
+          </a:prstGeom>
+        </p:spPr>
+        <p:txBody>
+          <a:bodyPr vert="horz" lIns="91440" tIns="45720" rIns="91440" bIns="45720" rtlCol="0"/>
+          <a:lstStyle>
+            <a:lvl1pPr algn="r">
+              <a:defRPr sz="1200"/>
+            </a:lvl1pPr>
+          </a:lstStyle>
+          <a:p>
+            <a:fld id="{F3B8E410-8E76-4847-91F0-A18BFEBE7685}" type="datetimeFigureOut">
+              <a:rPr lang="fr-FR" smtClean="0"/>
+              <a:t>16/11/2016</a:t>
+            </a:fld>
+            <a:endParaRPr lang="fr-FR"/>
+          </a:p>
+        </p:txBody>
+      </p:sp>
+      <p:sp>
+        <p:nvSpPr>
+          <p:cNvPr id="4" name="Espace réservé de l'image des diapositives 3"/>
+          <p:cNvSpPr>
+            <a:spLocks noGrp="1" noRot="1" noChangeAspect="1"/>
+          </p:cNvSpPr>
+          <p:nvPr>
+            <p:ph type="sldImg" idx="2"/>
+          </p:nvPr>
+        </p:nvSpPr>
+        <p:spPr>
+          <a:xfrm>
+            <a:off x="685800" y="1143000"/>
+            <a:ext cx="5486400" cy="3086100"/>
+          </a:xfrm>
+          <a:prstGeom prst="rect">
+            <a:avLst/>
+          </a:prstGeom>
+          <a:noFill/>
+          <a:ln w="12700">
+            <a:solidFill>
+              <a:prstClr val="black"/>
+            </a:solidFill>
+          </a:ln>
+        </p:spPr>
+        <p:txBody>
+          <a:bodyPr vert="horz" lIns="91440" tIns="45720" rIns="91440" bIns="45720" rtlCol="0" anchor="ctr"/>
+          <a:lstStyle/>
+          <a:p>
+            <a:endParaRPr lang="fr-FR"/>
+          </a:p>
+        </p:txBody>
+      </p:sp>
+      <p:sp>
+        <p:nvSpPr>
+          <p:cNvPr id="5" name="Espace réservé des notes 4"/>
+          <p:cNvSpPr>
+            <a:spLocks noGrp="1"/>
+          </p:cNvSpPr>
+          <p:nvPr>
+            <p:ph type="body" sz="quarter" idx="3"/>
+          </p:nvPr>
+        </p:nvSpPr>
+        <p:spPr>
+          <a:xfrm>
+            <a:off x="685800" y="4400550"/>
+            <a:ext cx="5486400" cy="3600450"/>
+          </a:xfrm>
+          <a:prstGeom prst="rect">
+            <a:avLst/>
+          </a:prstGeom>
+        </p:spPr>
+        <p:txBody>
+          <a:bodyPr vert="horz" lIns="91440" tIns="45720" rIns="91440" bIns="45720" rtlCol="0"/>
+          <a:lstStyle/>
+          <a:p>
+            <a:pPr lvl="0"/>
+            <a:r>
+              <a:rPr lang="fr-FR"/>
+              <a:t>Modifier les styles du texte du masque</a:t>
+            </a:r>
+          </a:p>
+          <a:p>
+            <a:pPr lvl="1"/>
+            <a:r>
+              <a:rPr lang="fr-FR"/>
+              <a:t>Deuxième niveau</a:t>
+            </a:r>
+          </a:p>
+          <a:p>
+            <a:pPr lvl="2"/>
+            <a:r>
+              <a:rPr lang="fr-FR"/>
+              <a:t>Troisième niveau</a:t>
+            </a:r>
+          </a:p>
+          <a:p>
+            <a:pPr lvl="3"/>
+            <a:r>
+              <a:rPr lang="fr-FR"/>
+              <a:t>Quatrième niveau</a:t>
+            </a:r>
+          </a:p>
+          <a:p>
+            <a:pPr lvl="4"/>
+            <a:r>
+              <a:rPr lang="fr-FR"/>
+              <a:t>Cinquième niveau</a:t>
+            </a:r>
+            <a:endParaRPr lang="fr-FR"/>
+          </a:p>
+        </p:txBody>
+      </p:sp>
+      <p:sp>
+        <p:nvSpPr>
+          <p:cNvPr id="6" name="Espace réservé du pied de page 5"/>
+          <p:cNvSpPr>
+            <a:spLocks noGrp="1"/>
+          </p:cNvSpPr>
+          <p:nvPr>
+            <p:ph type="ftr" sz="quarter" idx="4"/>
+          </p:nvPr>
+        </p:nvSpPr>
+        <p:spPr>
+          <a:xfrm>
+            <a:off x="0" y="8685213"/>
+            <a:ext cx="2971800" cy="458787"/>
+          </a:xfrm>
+          <a:prstGeom prst="rect">
+            <a:avLst/>
+          </a:prstGeom>
+        </p:spPr>
+        <p:txBody>
+          <a:bodyPr vert="horz" lIns="91440" tIns="45720" rIns="91440" bIns="45720" rtlCol="0" anchor="b"/>
+          <a:lstStyle>
+            <a:lvl1pPr algn="l">
+              <a:defRPr sz="1200"/>
+            </a:lvl1pPr>
+          </a:lstStyle>
+          <a:p>
+            <a:endParaRPr lang="fr-FR"/>
+          </a:p>
+        </p:txBody>
+      </p:sp>
+      <p:sp>
+        <p:nvSpPr>
+          <p:cNvPr id="7" name="Espace réservé du numéro de diapositive 6"/>
+          <p:cNvSpPr>
+            <a:spLocks noGrp="1"/>
+          </p:cNvSpPr>
+          <p:nvPr>
+            <p:ph type="sldNum" sz="quarter" idx="5"/>
+          </p:nvPr>
+        </p:nvSpPr>
+        <p:spPr>
+          <a:xfrm>
+            <a:off x="3884613" y="8685213"/>
+            <a:ext cx="2971800" cy="458787"/>
+          </a:xfrm>
+          <a:prstGeom prst="rect">
+            <a:avLst/>
+          </a:prstGeom>
+        </p:spPr>
+        <p:txBody>
+          <a:bodyPr vert="horz" lIns="91440" tIns="45720" rIns="91440" bIns="45720" rtlCol="0" anchor="b"/>
+          <a:lstStyle>
+            <a:lvl1pPr algn="r">
+              <a:defRPr sz="1200"/>
+            </a:lvl1pPr>
+          </a:lstStyle>
+          <a:p>
+            <a:fld id="{32EF5639-90FA-4D2B-89FD-C563D9010460}" type="slidenum">
+              <a:rPr lang="fr-FR" smtClean="0"/>
+              <a:t>‹N°›</a:t>
+            </a:fld>
+            <a:endParaRPr lang="fr-FR"/>
+          </a:p>
+        </p:txBody>
+      </p:sp>
+    </p:spTree>
+    <p:extLst>
+      <p:ext uri="{BB962C8B-B14F-4D97-AF65-F5344CB8AC3E}">
+        <p14:creationId xmlns:p14="http://schemas.microsoft.com/office/powerpoint/2010/main" val="1721867990"/>
+      </p:ext>
+    </p:extLst>
+  </p:cSld>
+  <p:clrMap bg1="lt1" tx1="dk1" bg2="lt2" tx2="dk2" accent1="accent1" accent2="accent2" accent3="accent3" accent4="accent4" accent5="accent5" accent6="accent6" hlink="hlink" folHlink="folHlink"/>
+  <p:notesStyle>
+    <a:lvl1pPr marL="0" algn="l" defTabSz="914400" rtl="0" eaLnBrk="1" latinLnBrk="0" hangingPunct="1">
+      <a:defRPr sz="1200" kern="1200">
+        <a:solidFill>
+          <a:schemeClr val="tx1"/>
+        </a:solidFill>
+        <a:latin typeface="+mn-lt"/>
+        <a:ea typeface="+mn-ea"/>
+        <a:cs typeface="+mn-cs"/>
+      </a:defRPr>
+    </a:lvl1pPr>
+    <a:lvl2pPr marL="457200" algn="l" defTabSz="914400" rtl="0" eaLnBrk="1" latinLnBrk="0" hangingPunct="1">
+      <a:defRPr sz="1200" kern="1200">
+        <a:solidFill>
+          <a:schemeClr val="tx1"/>
+        </a:solidFill>
+        <a:latin typeface="+mn-lt"/>
+        <a:ea typeface="+mn-ea"/>
+        <a:cs typeface="+mn-cs"/>
+      </a:defRPr>
+    </a:lvl2pPr>
+    <a:lvl3pPr marL="914400" algn="l" defTabSz="914400" rtl="0" eaLnBrk="1" latinLnBrk="0" hangingPunct="1">
+      <a:defRPr sz="1200" kern="1200">
+        <a:solidFill>
+          <a:schemeClr val="tx1"/>
+        </a:solidFill>
+        <a:latin typeface="+mn-lt"/>
+        <a:ea typeface="+mn-ea"/>
+        <a:cs typeface="+mn-cs"/>
+      </a:defRPr>
+    </a:lvl3pPr>
+    <a:lvl4pPr marL="1371600" algn="l" defTabSz="914400" rtl="0" eaLnBrk="1" latinLnBrk="0" hangingPunct="1">
+      <a:defRPr sz="1200" kern="1200">
+        <a:solidFill>
+          <a:schemeClr val="tx1"/>
+        </a:solidFill>
+        <a:latin typeface="+mn-lt"/>
+        <a:ea typeface="+mn-ea"/>
+        <a:cs typeface="+mn-cs"/>
+      </a:defRPr>
+    </a:lvl4pPr>
+    <a:lvl5pPr marL="1828800" algn="l" defTabSz="914400" rtl="0" eaLnBrk="1" latinLnBrk="0" hangingPunct="1">
+      <a:defRPr sz="1200" kern="1200">
+        <a:solidFill>
+          <a:schemeClr val="tx1"/>
+        </a:solidFill>
+        <a:latin typeface="+mn-lt"/>
+        <a:ea typeface="+mn-ea"/>
+        <a:cs typeface="+mn-cs"/>
+      </a:defRPr>
+    </a:lvl5pPr>
+    <a:lvl6pPr marL="2286000" algn="l" defTabSz="914400" rtl="0" eaLnBrk="1" latinLnBrk="0" hangingPunct="1">
+      <a:defRPr sz="1200" kern="1200">
+        <a:solidFill>
+          <a:schemeClr val="tx1"/>
+        </a:solidFill>
+        <a:latin typeface="+mn-lt"/>
+        <a:ea typeface="+mn-ea"/>
+        <a:cs typeface="+mn-cs"/>
+      </a:defRPr>
+    </a:lvl6pPr>
+    <a:lvl7pPr marL="2743200" algn="l" defTabSz="914400" rtl="0" eaLnBrk="1" latinLnBrk="0" hangingPunct="1">
+      <a:defRPr sz="1200" kern="1200">
+        <a:solidFill>
+          <a:schemeClr val="tx1"/>
+        </a:solidFill>
+        <a:latin typeface="+mn-lt"/>
+        <a:ea typeface="+mn-ea"/>
+        <a:cs typeface="+mn-cs"/>
+      </a:defRPr>
+    </a:lvl7pPr>
+    <a:lvl8pPr marL="3200400" algn="l" defTabSz="914400" rtl="0" eaLnBrk="1" latinLnBrk="0" hangingPunct="1">
+      <a:defRPr sz="1200" kern="1200">
+        <a:solidFill>
+          <a:schemeClr val="tx1"/>
+        </a:solidFill>
+        <a:latin typeface="+mn-lt"/>
+        <a:ea typeface="+mn-ea"/>
+        <a:cs typeface="+mn-cs"/>
+      </a:defRPr>
+    </a:lvl8pPr>
+    <a:lvl9pPr marL="3657600" algn="l" defTabSz="914400" rtl="0" eaLnBrk="1" latinLnBrk="0" hangingPunct="1">
+      <a:defRPr sz="1200" kern="1200">
+        <a:solidFill>
+          <a:schemeClr val="tx1"/>
+        </a:solidFill>
+        <a:latin typeface="+mn-lt"/>
+        <a:ea typeface="+mn-ea"/>
+        <a:cs typeface="+mn-cs"/>
+      </a:defRPr>
+    </a:lvl9pPr>
+  </p:notesStyle>
+</p:notesMaster>
+</file>
+
+<file path=ppt/notesSlides/notesSlide1.xml><?xml version="1.0" encoding="utf-8"?>
+<p:notes xmlns:a="http://schemas.openxmlformats.org/drawingml/2006/main" xmlns:r="http://schemas.openxmlformats.org/officeDocument/2006/relationships" xmlns:p="http://schemas.openxmlformats.org/presentationml/2006/main">
+  <p:cSld>
+    <p:spTree>
+      <p:nvGrpSpPr>
+        <p:cNvPr id="1" name=""/>
+        <p:cNvGrpSpPr/>
+        <p:nvPr/>
+      </p:nvGrpSpPr>
+      <p:grpSpPr>
+        <a:xfrm>
+          <a:off x="0" y="0"/>
+          <a:ext cx="0" cy="0"/>
+          <a:chOff x="0" y="0"/>
+          <a:chExt cx="0" cy="0"/>
+        </a:xfrm>
+      </p:grpSpPr>
+      <p:sp>
+        <p:nvSpPr>
+          <p:cNvPr id="2" name="Espace réservé de l'image des diapositives 1"/>
+          <p:cNvSpPr>
+            <a:spLocks noGrp="1" noRot="1" noChangeAspect="1"/>
+          </p:cNvSpPr>
+          <p:nvPr>
+            <p:ph type="sldImg"/>
+          </p:nvPr>
+        </p:nvSpPr>
+        <p:spPr/>
+      </p:sp>
+      <p:sp>
+        <p:nvSpPr>
+          <p:cNvPr id="3" name="Espace réservé des notes 2"/>
+          <p:cNvSpPr>
+            <a:spLocks noGrp="1"/>
+          </p:cNvSpPr>
+          <p:nvPr>
+            <p:ph type="body" idx="1"/>
+          </p:nvPr>
+        </p:nvSpPr>
+        <p:spPr/>
+        <p:txBody>
+          <a:bodyPr/>
+          <a:lstStyle/>
+          <a:p>
+            <a:endParaRPr lang="fr-FR" dirty="0"/>
+          </a:p>
+        </p:txBody>
+      </p:sp>
+      <p:sp>
+        <p:nvSpPr>
+          <p:cNvPr id="4" name="Espace réservé du numéro de diapositive 3"/>
+          <p:cNvSpPr>
+            <a:spLocks noGrp="1"/>
+          </p:cNvSpPr>
+          <p:nvPr>
+            <p:ph type="sldNum" sz="quarter" idx="10"/>
+          </p:nvPr>
+        </p:nvSpPr>
+        <p:spPr/>
+        <p:txBody>
+          <a:bodyPr/>
+          <a:lstStyle/>
+          <a:p>
+            <a:fld id="{32EF5639-90FA-4D2B-89FD-C563D9010460}" type="slidenum">
+              <a:rPr lang="fr-FR" smtClean="0"/>
+              <a:t>2</a:t>
+            </a:fld>
+            <a:endParaRPr lang="fr-FR"/>
+          </a:p>
+        </p:txBody>
+      </p:sp>
+    </p:spTree>
+    <p:extLst>
+      <p:ext uri="{BB962C8B-B14F-4D97-AF65-F5344CB8AC3E}">
+        <p14:creationId xmlns:p14="http://schemas.microsoft.com/office/powerpoint/2010/main" val="1511332231"/>
+      </p:ext>
+    </p:extLst>
+  </p:cSld>
+  <p:clrMapOvr>
+    <a:masterClrMapping/>
+  </p:clrMapOvr>
+</p:notes>
+</file>
+
+<file path=ppt/notesSlides/notesSlide2.xml><?xml version="1.0" encoding="utf-8"?>
+<p:notes xmlns:a="http://schemas.openxmlformats.org/drawingml/2006/main" xmlns:r="http://schemas.openxmlformats.org/officeDocument/2006/relationships" xmlns:p="http://schemas.openxmlformats.org/presentationml/2006/main">
+  <p:cSld>
+    <p:spTree>
+      <p:nvGrpSpPr>
+        <p:cNvPr id="1" name=""/>
+        <p:cNvGrpSpPr/>
+        <p:nvPr/>
+      </p:nvGrpSpPr>
+      <p:grpSpPr>
+        <a:xfrm>
+          <a:off x="0" y="0"/>
+          <a:ext cx="0" cy="0"/>
+          <a:chOff x="0" y="0"/>
+          <a:chExt cx="0" cy="0"/>
+        </a:xfrm>
+      </p:grpSpPr>
+      <p:sp>
+        <p:nvSpPr>
+          <p:cNvPr id="2" name="Espace réservé de l'image des diapositives 1"/>
+          <p:cNvSpPr>
+            <a:spLocks noGrp="1" noRot="1" noChangeAspect="1"/>
+          </p:cNvSpPr>
+          <p:nvPr>
+            <p:ph type="sldImg"/>
+          </p:nvPr>
+        </p:nvSpPr>
+        <p:spPr/>
+      </p:sp>
+      <p:sp>
+        <p:nvSpPr>
+          <p:cNvPr id="3" name="Espace réservé des notes 2"/>
+          <p:cNvSpPr>
+            <a:spLocks noGrp="1"/>
+          </p:cNvSpPr>
+          <p:nvPr>
+            <p:ph type="body" idx="1"/>
+          </p:nvPr>
+        </p:nvSpPr>
+        <p:spPr/>
+        <p:txBody>
+          <a:bodyPr/>
+          <a:lstStyle/>
+          <a:p>
+            <a:pPr marL="171450" indent="-171450">
+              <a:buFontTx/>
+              <a:buChar char="-"/>
+            </a:pPr>
+            <a:r>
+              <a:rPr lang="fr-FR" dirty="0"/>
+              <a:t>Concept </a:t>
+            </a:r>
+            <a:r>
+              <a:rPr lang="fr-FR" dirty="0" err="1"/>
+              <a:t>interessant</a:t>
+            </a:r>
+            <a:endParaRPr lang="fr-FR" baseline="0" dirty="0"/>
+          </a:p>
+          <a:p>
+            <a:pPr marL="171450" indent="-171450">
+              <a:buFontTx/>
+              <a:buChar char="-"/>
+            </a:pPr>
+            <a:r>
+              <a:rPr lang="fr-FR" baseline="0" dirty="0"/>
+              <a:t>Domotique : écran de control de la maison</a:t>
+            </a:r>
+          </a:p>
+          <a:p>
+            <a:pPr marL="0" indent="0">
+              <a:buFontTx/>
+              <a:buNone/>
+            </a:pPr>
+            <a:endParaRPr lang="fr-FR" baseline="0" dirty="0"/>
+          </a:p>
+          <a:p>
+            <a:pPr marL="171450" indent="-171450">
+              <a:buFontTx/>
+              <a:buChar char="-"/>
+            </a:pPr>
+            <a:r>
+              <a:rPr lang="fr-FR" baseline="0" dirty="0"/>
+              <a:t>Amélioration : vitesse de détection avec le choix des condos</a:t>
+            </a:r>
+          </a:p>
+          <a:p>
+            <a:pPr marL="171450" indent="-171450">
+              <a:buFontTx/>
+              <a:buChar char="-"/>
+            </a:pPr>
+            <a:r>
+              <a:rPr lang="fr-FR" baseline="0" dirty="0"/>
+              <a:t>Écart entre les tensions lors de la mesure selon chaque surface de contact</a:t>
+            </a:r>
+          </a:p>
+          <a:p>
+            <a:pPr marL="0" indent="0">
+              <a:buFontTx/>
+              <a:buNone/>
+            </a:pPr>
+            <a:endParaRPr lang="fr-FR" baseline="0" dirty="0"/>
+          </a:p>
+          <a:p>
+            <a:pPr marL="171450" indent="-171450">
+              <a:buFontTx/>
+              <a:buChar char="-"/>
+            </a:pPr>
+            <a:r>
+              <a:rPr lang="fr-FR" baseline="0" dirty="0"/>
+              <a:t>Contraintes : matériel </a:t>
+            </a:r>
+          </a:p>
+          <a:p>
+            <a:pPr marL="171450" indent="-171450">
+              <a:buFontTx/>
+              <a:buChar char="-"/>
+            </a:pPr>
+            <a:r>
+              <a:rPr lang="fr-FR" baseline="0" dirty="0"/>
+              <a:t>Temps, pour mon cas, l’année dernière 1 an, ici deux jours,</a:t>
+            </a:r>
+          </a:p>
+          <a:p>
+            <a:pPr marL="0" indent="0">
+              <a:buFontTx/>
+              <a:buNone/>
+            </a:pPr>
+            <a:endParaRPr lang="fr-FR" baseline="0" dirty="0"/>
+          </a:p>
+          <a:p>
+            <a:pPr marL="0" indent="0">
+              <a:buFontTx/>
+              <a:buNone/>
+            </a:pPr>
+            <a:r>
+              <a:rPr lang="fr-FR" baseline="0" dirty="0"/>
+              <a:t>- (Bilan personnel) ?</a:t>
+            </a:r>
+          </a:p>
+          <a:p>
+            <a:pPr marL="171450" indent="-171450">
+              <a:buFontTx/>
+              <a:buChar char="-"/>
+            </a:pPr>
+            <a:endParaRPr lang="fr-FR" baseline="0" dirty="0"/>
+          </a:p>
+          <a:p>
+            <a:pPr marL="0" indent="0">
+              <a:buFontTx/>
+              <a:buNone/>
+            </a:pPr>
+            <a:endParaRPr lang="fr-FR" dirty="0"/>
+          </a:p>
+        </p:txBody>
+      </p:sp>
+      <p:sp>
+        <p:nvSpPr>
+          <p:cNvPr id="4" name="Espace réservé du numéro de diapositive 3"/>
+          <p:cNvSpPr>
+            <a:spLocks noGrp="1"/>
+          </p:cNvSpPr>
+          <p:nvPr>
+            <p:ph type="sldNum" sz="quarter" idx="10"/>
+          </p:nvPr>
+        </p:nvSpPr>
+        <p:spPr/>
+        <p:txBody>
+          <a:bodyPr/>
+          <a:lstStyle/>
+          <a:p>
+            <a:fld id="{32EF5639-90FA-4D2B-89FD-C563D9010460}" type="slidenum">
+              <a:rPr lang="fr-FR" smtClean="0"/>
+              <a:t>5</a:t>
+            </a:fld>
+            <a:endParaRPr lang="fr-FR"/>
+          </a:p>
+        </p:txBody>
+      </p:sp>
+    </p:spTree>
+    <p:extLst>
+      <p:ext uri="{BB962C8B-B14F-4D97-AF65-F5344CB8AC3E}">
+        <p14:creationId xmlns:p14="http://schemas.microsoft.com/office/powerpoint/2010/main" val="1743345975"/>
+      </p:ext>
+    </p:extLst>
+  </p:cSld>
+  <p:clrMapOvr>
+    <a:masterClrMapping/>
+  </p:clrMapOvr>
+</p:notes>
+</file>
+
+<file path=ppt/notesSlides/notesSlide3.xml><?xml version="1.0" encoding="utf-8"?>
+<p:notes xmlns:a="http://schemas.openxmlformats.org/drawingml/2006/main" xmlns:r="http://schemas.openxmlformats.org/officeDocument/2006/relationships" xmlns:p="http://schemas.openxmlformats.org/presentationml/2006/main">
+  <p:cSld>
+    <p:spTree>
+      <p:nvGrpSpPr>
+        <p:cNvPr id="1" name=""/>
+        <p:cNvGrpSpPr/>
+        <p:nvPr/>
+      </p:nvGrpSpPr>
+      <p:grpSpPr>
+        <a:xfrm>
+          <a:off x="0" y="0"/>
+          <a:ext cx="0" cy="0"/>
+          <a:chOff x="0" y="0"/>
+          <a:chExt cx="0" cy="0"/>
+        </a:xfrm>
+      </p:grpSpPr>
+      <p:sp>
+        <p:nvSpPr>
+          <p:cNvPr id="2" name="Espace réservé de l'image des diapositives 1"/>
+          <p:cNvSpPr>
+            <a:spLocks noGrp="1" noRot="1" noChangeAspect="1"/>
+          </p:cNvSpPr>
+          <p:nvPr>
+            <p:ph type="sldImg"/>
+          </p:nvPr>
+        </p:nvSpPr>
+        <p:spPr/>
+      </p:sp>
+      <p:sp>
+        <p:nvSpPr>
+          <p:cNvPr id="3" name="Espace réservé des notes 2"/>
+          <p:cNvSpPr>
+            <a:spLocks noGrp="1"/>
+          </p:cNvSpPr>
+          <p:nvPr>
+            <p:ph type="body" idx="1"/>
+          </p:nvPr>
+        </p:nvSpPr>
+        <p:spPr/>
+        <p:txBody>
+          <a:bodyPr/>
+          <a:lstStyle/>
+          <a:p>
+            <a:r>
+              <a:rPr lang="fr-FR" dirty="0"/>
+              <a:t>C = Q/U ; Q= CU</a:t>
+            </a:r>
+            <a:r>
+              <a:rPr lang="fr-FR" baseline="0" dirty="0"/>
+              <a:t> ; U = Q/C</a:t>
+            </a:r>
+          </a:p>
+          <a:p>
+            <a:r>
+              <a:rPr lang="fr-FR" dirty="0"/>
+              <a:t>Q la charge stockée en coulombs</a:t>
+            </a:r>
+          </a:p>
+          <a:p>
+            <a:endParaRPr lang="fr-FR" dirty="0"/>
+          </a:p>
+          <a:p>
+            <a:r>
+              <a:rPr lang="fr-FR" dirty="0"/>
+              <a:t>Temps de charge : 5T = RC</a:t>
+            </a:r>
+          </a:p>
+          <a:p>
+            <a:endParaRPr lang="fr-FR" dirty="0"/>
+          </a:p>
+          <a:p>
+            <a:r>
+              <a:rPr lang="fr-FR" dirty="0" err="1"/>
+              <a:t>Bode</a:t>
+            </a:r>
+            <a:r>
+              <a:rPr lang="fr-FR" dirty="0"/>
+              <a:t> : dB en fonction de la fréquence</a:t>
+            </a:r>
+            <a:r>
+              <a:rPr lang="fr-FR" baseline="0" dirty="0"/>
+              <a:t> puis degrés en fonction de la fréquence</a:t>
+            </a:r>
+          </a:p>
+          <a:p>
+            <a:r>
+              <a:rPr lang="fr-FR" baseline="0" dirty="0"/>
+              <a:t>Échelle logarithmique abscisses, </a:t>
+            </a:r>
+            <a:r>
+              <a:rPr lang="fr-FR" baseline="0" dirty="0" err="1"/>
+              <a:t>fréq</a:t>
+            </a:r>
+            <a:r>
+              <a:rPr lang="fr-FR" baseline="0" dirty="0"/>
+              <a:t> de coupure aux inters </a:t>
+            </a:r>
+            <a:r>
+              <a:rPr lang="fr-FR" baseline="0"/>
+              <a:t>des asymptotes</a:t>
+            </a:r>
+            <a:endParaRPr lang="fr-FR" dirty="0"/>
+          </a:p>
+        </p:txBody>
+      </p:sp>
+      <p:sp>
+        <p:nvSpPr>
+          <p:cNvPr id="4" name="Espace réservé du numéro de diapositive 3"/>
+          <p:cNvSpPr>
+            <a:spLocks noGrp="1"/>
+          </p:cNvSpPr>
+          <p:nvPr>
+            <p:ph type="sldNum" sz="quarter" idx="10"/>
+          </p:nvPr>
+        </p:nvSpPr>
+        <p:spPr/>
+        <p:txBody>
+          <a:bodyPr/>
+          <a:lstStyle/>
+          <a:p>
+            <a:fld id="{32EF5639-90FA-4D2B-89FD-C563D9010460}" type="slidenum">
+              <a:rPr lang="fr-FR" smtClean="0"/>
+              <a:t>6</a:t>
+            </a:fld>
+            <a:endParaRPr lang="fr-FR"/>
+          </a:p>
+        </p:txBody>
+      </p:sp>
+    </p:spTree>
+    <p:extLst>
+      <p:ext uri="{BB962C8B-B14F-4D97-AF65-F5344CB8AC3E}">
+        <p14:creationId xmlns:p14="http://schemas.microsoft.com/office/powerpoint/2010/main" val="4078119014"/>
+      </p:ext>
+    </p:extLst>
+  </p:cSld>
+  <p:clrMapOvr>
+    <a:masterClrMapping/>
+  </p:clrMapOvr>
+</p:notes>
 </file>
 
 <file path=ppt/slideLayouts/slideLayout1.xml><?xml version="1.0" encoding="utf-8"?>
@@ -4392,7 +5163,7 @@
           <a:p>
             <a:fld id="{48A87A34-81AB-432B-8DAE-1953F412C126}" type="datetimeFigureOut">
               <a:rPr lang="en-US" dirty="0"/>
-              <a:t>11/15/2016</a:t>
+              <a:t>11/16/2016</a:t>
             </a:fld>
             <a:endParaRPr lang="en-US" dirty="0"/>
           </a:p>
@@ -4654,7 +5425,7 @@
           <a:p>
             <a:fld id="{48A87A34-81AB-432B-8DAE-1953F412C126}" type="datetimeFigureOut">
               <a:rPr lang="en-US" dirty="0"/>
-              <a:t>11/15/2016</a:t>
+              <a:t>11/16/2016</a:t>
             </a:fld>
             <a:endParaRPr lang="en-US" dirty="0"/>
           </a:p>
@@ -4845,7 +5616,7 @@
           <a:p>
             <a:fld id="{48A87A34-81AB-432B-8DAE-1953F412C126}" type="datetimeFigureOut">
               <a:rPr lang="en-US" dirty="0"/>
-              <a:t>11/15/2016</a:t>
+              <a:t>11/16/2016</a:t>
             </a:fld>
             <a:endParaRPr lang="en-US" dirty="0"/>
           </a:p>
@@ -5103,7 +5874,7 @@
           <a:p>
             <a:fld id="{48A87A34-81AB-432B-8DAE-1953F412C126}" type="datetimeFigureOut">
               <a:rPr lang="en-US" dirty="0"/>
-              <a:t>11/15/2016</a:t>
+              <a:t>11/16/2016</a:t>
             </a:fld>
             <a:endParaRPr lang="en-US" dirty="0"/>
           </a:p>
@@ -5532,7 +6303,7 @@
           <a:p>
             <a:fld id="{48A87A34-81AB-432B-8DAE-1953F412C126}" type="datetimeFigureOut">
               <a:rPr lang="en-US" dirty="0"/>
-              <a:t>11/15/2016</a:t>
+              <a:t>11/16/2016</a:t>
             </a:fld>
             <a:endParaRPr lang="en-US" dirty="0"/>
           </a:p>
@@ -6073,7 +6844,7 @@
           <a:p>
             <a:fld id="{48A87A34-81AB-432B-8DAE-1953F412C126}" type="datetimeFigureOut">
               <a:rPr lang="en-US" dirty="0"/>
-              <a:t>11/15/2016</a:t>
+              <a:t>11/16/2016</a:t>
             </a:fld>
             <a:endParaRPr lang="en-US" dirty="0"/>
           </a:p>
@@ -6788,7 +7559,7 @@
           <a:p>
             <a:fld id="{48A87A34-81AB-432B-8DAE-1953F412C126}" type="datetimeFigureOut">
               <a:rPr lang="en-US" dirty="0"/>
-              <a:t>11/15/2016</a:t>
+              <a:t>11/16/2016</a:t>
             </a:fld>
             <a:endParaRPr lang="en-US" dirty="0"/>
           </a:p>
@@ -6953,7 +7724,7 @@
           <a:p>
             <a:fld id="{48A87A34-81AB-432B-8DAE-1953F412C126}" type="datetimeFigureOut">
               <a:rPr lang="en-US" dirty="0"/>
-              <a:t>11/15/2016</a:t>
+              <a:t>11/16/2016</a:t>
             </a:fld>
             <a:endParaRPr lang="en-US" dirty="0"/>
           </a:p>
@@ -7128,7 +7899,7 @@
           <a:p>
             <a:fld id="{48A87A34-81AB-432B-8DAE-1953F412C126}" type="datetimeFigureOut">
               <a:rPr lang="en-US" dirty="0"/>
-              <a:t>11/15/2016</a:t>
+              <a:t>11/16/2016</a:t>
             </a:fld>
             <a:endParaRPr lang="en-US" dirty="0"/>
           </a:p>
@@ -7293,7 +8064,7 @@
           <a:p>
             <a:fld id="{48A87A34-81AB-432B-8DAE-1953F412C126}" type="datetimeFigureOut">
               <a:rPr lang="en-US" dirty="0"/>
-              <a:t>11/15/2016</a:t>
+              <a:t>11/16/2016</a:t>
             </a:fld>
             <a:endParaRPr lang="en-US" dirty="0"/>
           </a:p>
@@ -7538,7 +8309,7 @@
           <a:p>
             <a:fld id="{48A87A34-81AB-432B-8DAE-1953F412C126}" type="datetimeFigureOut">
               <a:rPr lang="en-US" dirty="0"/>
-              <a:t>11/15/2016</a:t>
+              <a:t>11/16/2016</a:t>
             </a:fld>
             <a:endParaRPr lang="en-US" dirty="0"/>
           </a:p>
@@ -7765,7 +8536,7 @@
           <a:p>
             <a:fld id="{48A87A34-81AB-432B-8DAE-1953F412C126}" type="datetimeFigureOut">
               <a:rPr lang="en-US" dirty="0"/>
-              <a:t>11/15/2016</a:t>
+              <a:t>11/16/2016</a:t>
             </a:fld>
             <a:endParaRPr lang="en-US" dirty="0"/>
           </a:p>
@@ -8141,7 +8912,7 @@
           <a:p>
             <a:fld id="{48A87A34-81AB-432B-8DAE-1953F412C126}" type="datetimeFigureOut">
               <a:rPr lang="en-US" dirty="0"/>
-              <a:t>11/15/2016</a:t>
+              <a:t>11/16/2016</a:t>
             </a:fld>
             <a:endParaRPr lang="en-US" dirty="0"/>
           </a:p>
@@ -8254,7 +9025,7 @@
           <a:p>
             <a:fld id="{48A87A34-81AB-432B-8DAE-1953F412C126}" type="datetimeFigureOut">
               <a:rPr lang="en-US" dirty="0"/>
-              <a:t>11/15/2016</a:t>
+              <a:t>11/16/2016</a:t>
             </a:fld>
             <a:endParaRPr lang="en-US" dirty="0"/>
           </a:p>
@@ -8344,7 +9115,7 @@
           <a:p>
             <a:fld id="{48A87A34-81AB-432B-8DAE-1953F412C126}" type="datetimeFigureOut">
               <a:rPr lang="en-US" dirty="0"/>
-              <a:t>11/15/2016</a:t>
+              <a:t>11/16/2016</a:t>
             </a:fld>
             <a:endParaRPr lang="en-US" dirty="0"/>
           </a:p>
@@ -8588,7 +9359,7 @@
           <a:p>
             <a:fld id="{48A87A34-81AB-432B-8DAE-1953F412C126}" type="datetimeFigureOut">
               <a:rPr lang="en-US" dirty="0"/>
-              <a:t>11/15/2016</a:t>
+              <a:t>11/16/2016</a:t>
             </a:fld>
             <a:endParaRPr lang="en-US" dirty="0"/>
           </a:p>
@@ -8863,7 +9634,7 @@
           <a:p>
             <a:fld id="{48A87A34-81AB-432B-8DAE-1953F412C126}" type="datetimeFigureOut">
               <a:rPr lang="en-US" dirty="0"/>
-              <a:t>11/15/2016</a:t>
+              <a:t>11/16/2016</a:t>
             </a:fld>
             <a:endParaRPr lang="en-US" dirty="0"/>
           </a:p>
@@ -11936,7 +12707,7 @@
             <a:fld id="{48A87A34-81AB-432B-8DAE-1953F412C126}" type="datetimeFigureOut">
               <a:rPr lang="en-US" dirty="0"/>
               <a:pPr/>
-              <a:t>11/15/2016</a:t>
+              <a:t>11/16/2016</a:t>
             </a:fld>
             <a:endParaRPr lang="en-US" dirty="0"/>
           </a:p>
@@ -12364,14 +13135,21 @@
         </p:nvSpPr>
         <p:spPr/>
         <p:txBody>
-          <a:bodyPr/>
+          <a:bodyPr>
+            <a:noAutofit/>
+          </a:bodyPr>
           <a:lstStyle/>
           <a:p>
             <a:pPr algn="ctr"/>
             <a:r>
-              <a:rPr lang="fr-FR" dirty="0"/>
-              <a:t>Projet smart-patate</a:t>
+              <a:rPr lang="fr-FR" sz="8800" dirty="0"/>
+              <a:t>Projet </a:t>
             </a:r>
+            <a:r>
+              <a:rPr lang="fr-FR" sz="8800" dirty="0" err="1"/>
+              <a:t>smartpatate</a:t>
+            </a:r>
+            <a:endParaRPr lang="fr-FR" sz="8800" dirty="0"/>
           </a:p>
         </p:txBody>
       </p:sp>
@@ -12387,31 +13165,33 @@
         </p:nvSpPr>
         <p:spPr/>
         <p:txBody>
-          <a:bodyPr/>
+          <a:bodyPr>
+            <a:normAutofit/>
+          </a:bodyPr>
           <a:lstStyle/>
           <a:p>
             <a:r>
-              <a:rPr lang="en-GB" cap="none" dirty="0">
+              <a:rPr lang="en-GB" sz="3200" cap="none" dirty="0">
                 <a:latin typeface="Arial" panose="020B0604020202020204" pitchFamily="34" charset="0"/>
                 <a:cs typeface="Arial" panose="020B0604020202020204" pitchFamily="34" charset="0"/>
               </a:rPr>
               <a:t>Une nouvelle </a:t>
             </a:r>
             <a:r>
-              <a:rPr lang="fr-FR" cap="none" dirty="0">
+              <a:rPr lang="fr-FR" sz="3200" cap="none" dirty="0">
                 <a:latin typeface="Arial" panose="020B0604020202020204" pitchFamily="34" charset="0"/>
                 <a:cs typeface="Arial" panose="020B0604020202020204" pitchFamily="34" charset="0"/>
               </a:rPr>
               <a:t>technologie</a:t>
             </a:r>
             <a:r>
-              <a:rPr lang="en-GB" cap="none" dirty="0">
+              <a:rPr lang="en-GB" sz="3200" cap="none" dirty="0">
                 <a:latin typeface="Arial" panose="020B0604020202020204" pitchFamily="34" charset="0"/>
                 <a:cs typeface="Arial" panose="020B0604020202020204" pitchFamily="34" charset="0"/>
               </a:rPr>
               <a:t> interactive.</a:t>
             </a:r>
-            <a:endParaRPr lang="fr-FR" cap="none" dirty="0">
+            <a:endParaRPr lang="fr-FR" sz="3200" cap="none" dirty="0">
               <a:latin typeface="Arial" panose="020B0604020202020204" pitchFamily="34" charset="0"/>
               <a:cs typeface="Arial" panose="020B0604020202020204" pitchFamily="34" charset="0"/>
             </a:endParaRPr>
@@ -12464,16 +13244,20 @@
           <a:lstStyle/>
           <a:p>
             <a:r>
-              <a:rPr lang="fr-FR" dirty="0"/>
+              <a:rPr lang="fr-FR" sz="6000" dirty="0"/>
               <a:t>Présentation</a:t>
             </a:r>
             <a:r>
-              <a:rPr lang="en-GB" dirty="0"/>
+              <a:rPr lang="en-GB" sz="6000" dirty="0"/>
               <a:t> </a:t>
             </a:r>
             <a:r>
+              <a:rPr lang="fr-FR" sz="6000" dirty="0"/>
+              <a:t>du projet</a:t>
+            </a:r>
+            <a:r>
               <a:rPr lang="fr-FR" dirty="0"/>
-              <a:t>du projet </a:t>
+              <a:t> </a:t>
             </a:r>
           </a:p>
         </p:txBody>
@@ -12494,32 +13278,28 @@
           <a:lstStyle/>
           <a:p>
             <a:r>
-              <a:rPr lang="fr-FR" dirty="0"/>
+              <a:rPr lang="fr-FR" sz="3200" dirty="0"/>
               <a:t>Un projet initié par Disney </a:t>
             </a:r>
             <a:r>
-              <a:rPr lang="fr-FR" dirty="0" err="1"/>
+              <a:rPr lang="fr-FR" sz="3200" dirty="0" err="1"/>
               <a:t>Research</a:t>
             </a:r>
             <a:r>
-              <a:rPr lang="fr-FR" dirty="0"/>
+              <a:rPr lang="fr-FR" sz="3200" dirty="0"/>
               <a:t>.</a:t>
             </a:r>
           </a:p>
           <a:p>
             <a:r>
-              <a:rPr lang="fr-FR" dirty="0"/>
+              <a:rPr lang="fr-FR" sz="3200" dirty="0"/>
               <a:t>Le but de ce projet.</a:t>
             </a:r>
           </a:p>
           <a:p>
             <a:r>
-              <a:rPr lang="fr-FR" dirty="0"/>
-              <a:t>Les étapes de </a:t>
-            </a:r>
-            <a:r>
-              <a:rPr lang="fr-FR"/>
-              <a:t>recherches.</a:t>
+              <a:rPr lang="fr-FR" sz="3200" dirty="0"/>
+              <a:t>Les étapes de recherches.</a:t>
             </a:r>
           </a:p>
           <a:p>
@@ -12569,11 +13349,13 @@
         </p:nvSpPr>
         <p:spPr/>
         <p:txBody>
-          <a:bodyPr/>
+          <a:bodyPr>
+            <a:normAutofit/>
+          </a:bodyPr>
           <a:lstStyle/>
           <a:p>
             <a:r>
-              <a:rPr lang="fr-FR" dirty="0"/>
+              <a:rPr lang="fr-FR" sz="4800" dirty="0"/>
               <a:t>Résultat des expériences menées</a:t>
             </a:r>
           </a:p>
@@ -12683,6 +13465,41 @@
           </a:prstGeom>
         </p:spPr>
       </p:pic>
+      <p:cxnSp>
+        <p:nvCxnSpPr>
+          <p:cNvPr id="6" name="Connecteur droit 5"/>
+          <p:cNvCxnSpPr/>
+          <p:nvPr/>
+        </p:nvCxnSpPr>
+        <p:spPr>
+          <a:xfrm>
+            <a:off x="6530109" y="1751265"/>
+            <a:ext cx="0" cy="4723426"/>
+          </a:xfrm>
+          <a:prstGeom prst="line">
+            <a:avLst/>
+          </a:prstGeom>
+          <a:ln>
+            <a:solidFill>
+              <a:schemeClr val="bg1"/>
+            </a:solidFill>
+          </a:ln>
+        </p:spPr>
+        <p:style>
+          <a:lnRef idx="1">
+            <a:schemeClr val="accent1"/>
+          </a:lnRef>
+          <a:fillRef idx="0">
+            <a:schemeClr val="accent1"/>
+          </a:fillRef>
+          <a:effectRef idx="0">
+            <a:schemeClr val="accent1"/>
+          </a:effectRef>
+          <a:fontRef idx="minor">
+            <a:schemeClr val="tx1"/>
+          </a:fontRef>
+        </p:style>
+      </p:cxnSp>
     </p:spTree>
     <p:extLst>
       <p:ext uri="{BB962C8B-B14F-4D97-AF65-F5344CB8AC3E}">
@@ -12725,11 +13542,13 @@
         </p:nvSpPr>
         <p:spPr/>
         <p:txBody>
-          <a:bodyPr/>
+          <a:bodyPr>
+            <a:normAutofit/>
+          </a:bodyPr>
           <a:lstStyle/>
           <a:p>
             <a:r>
-              <a:rPr lang="fr-FR" dirty="0"/>
+              <a:rPr lang="fr-FR" sz="4400" dirty="0"/>
               <a:t>Explication du fonctionnement du circuit et capteur</a:t>
             </a:r>
           </a:p>
@@ -12753,7 +13572,7 @@
         </p:blipFill>
         <p:spPr>
           <a:xfrm>
-            <a:off x="5184399" y="1816672"/>
+            <a:off x="5165927" y="2010636"/>
             <a:ext cx="6429573" cy="4448690"/>
           </a:xfrm>
           <a:prstGeom prst="rect">
@@ -12827,11 +13646,13 @@
         </p:nvSpPr>
         <p:spPr/>
         <p:txBody>
-          <a:bodyPr/>
+          <a:bodyPr>
+            <a:normAutofit/>
+          </a:bodyPr>
           <a:lstStyle/>
           <a:p>
             <a:r>
-              <a:rPr lang="fr-FR" dirty="0"/>
+              <a:rPr lang="fr-FR" sz="4800" dirty="0"/>
               <a:t>Bilan du projet</a:t>
             </a:r>
           </a:p>
@@ -12853,25 +13674,25 @@
           <a:lstStyle/>
           <a:p>
             <a:r>
-              <a:rPr lang="fr-FR" dirty="0"/>
+              <a:rPr lang="fr-FR" sz="4000" dirty="0"/>
               <a:t>La réalisation du prototype.</a:t>
             </a:r>
           </a:p>
           <a:p>
             <a:r>
-              <a:rPr lang="fr-FR" dirty="0"/>
+              <a:rPr lang="fr-FR" sz="4000" dirty="0"/>
               <a:t>Les améliorations possible.</a:t>
             </a:r>
           </a:p>
           <a:p>
             <a:r>
-              <a:rPr lang="fr-FR" dirty="0"/>
+              <a:rPr lang="fr-FR" sz="4000" dirty="0"/>
               <a:t>Les contraintes rencontrées.</a:t>
             </a:r>
           </a:p>
           <a:p>
             <a:r>
-              <a:rPr lang="fr-FR" dirty="0"/>
+              <a:rPr lang="fr-FR" sz="4000" dirty="0"/>
               <a:t>Conclusion générale. </a:t>
             </a:r>
           </a:p>
@@ -12881,6 +13702,85 @@
     <p:extLst>
       <p:ext uri="{BB962C8B-B14F-4D97-AF65-F5344CB8AC3E}">
         <p14:creationId xmlns:p14="http://schemas.microsoft.com/office/powerpoint/2010/main" val="2463793308"/>
+      </p:ext>
+    </p:extLst>
+  </p:cSld>
+  <p:clrMapOvr>
+    <a:masterClrMapping/>
+  </p:clrMapOvr>
+</p:sld>
+</file>
+
+<file path=ppt/slides/slide6.xml><?xml version="1.0" encoding="utf-8"?>
+<p:sld xmlns:a="http://schemas.openxmlformats.org/drawingml/2006/main" xmlns:r="http://schemas.openxmlformats.org/officeDocument/2006/relationships" xmlns:p="http://schemas.openxmlformats.org/presentationml/2006/main">
+  <p:cSld>
+    <p:spTree>
+      <p:nvGrpSpPr>
+        <p:cNvPr id="1" name=""/>
+        <p:cNvGrpSpPr/>
+        <p:nvPr/>
+      </p:nvGrpSpPr>
+      <p:grpSpPr>
+        <a:xfrm>
+          <a:off x="0" y="0"/>
+          <a:ext cx="0" cy="0"/>
+          <a:chOff x="0" y="0"/>
+          <a:chExt cx="0" cy="0"/>
+        </a:xfrm>
+      </p:grpSpPr>
+      <p:sp>
+        <p:nvSpPr>
+          <p:cNvPr id="2" name="Titre 1"/>
+          <p:cNvSpPr>
+            <a:spLocks noGrp="1"/>
+          </p:cNvSpPr>
+          <p:nvPr>
+            <p:ph type="title"/>
+          </p:nvPr>
+        </p:nvSpPr>
+        <p:spPr/>
+        <p:txBody>
+          <a:bodyPr>
+            <a:normAutofit/>
+          </a:bodyPr>
+          <a:lstStyle/>
+          <a:p>
+            <a:r>
+              <a:rPr lang="fr-FR" sz="5400" dirty="0"/>
+              <a:t>MERCI de votre attention</a:t>
+            </a:r>
+          </a:p>
+        </p:txBody>
+      </p:sp>
+      <p:sp>
+        <p:nvSpPr>
+          <p:cNvPr id="3" name="Espace réservé du contenu 2"/>
+          <p:cNvSpPr>
+            <a:spLocks noGrp="1"/>
+          </p:cNvSpPr>
+          <p:nvPr>
+            <p:ph idx="1"/>
+          </p:nvPr>
+        </p:nvSpPr>
+        <p:spPr/>
+        <p:txBody>
+          <a:bodyPr/>
+          <a:lstStyle/>
+          <a:p>
+            <a:pPr marL="0" indent="0">
+              <a:buNone/>
+            </a:pPr>
+            <a:r>
+              <a:rPr lang="fr-FR" dirty="0"/>
+              <a:t>Avez-vous des questions ?</a:t>
+            </a:r>
+          </a:p>
+        </p:txBody>
+      </p:sp>
+    </p:spTree>
+    <p:extLst>
+      <p:ext uri="{BB962C8B-B14F-4D97-AF65-F5344CB8AC3E}">
+        <p14:creationId xmlns:p14="http://schemas.microsoft.com/office/powerpoint/2010/main" val="1354216296"/>
       </p:ext>
     </p:extLst>
   </p:cSld>
@@ -13139,4 +14039,299 @@
     </a:ext>
   </a:extLst>
 </a:theme>
+</file>
+
+<file path=ppt/theme/theme2.xml><?xml version="1.0" encoding="utf-8"?>
+<a:theme xmlns:a="http://schemas.openxmlformats.org/drawingml/2006/main" name="Thème Office">
+  <a:themeElements>
+    <a:clrScheme name="Office">
+      <a:dk1>
+        <a:sysClr val="windowText" lastClr="000000"/>
+      </a:dk1>
+      <a:lt1>
+        <a:sysClr val="window" lastClr="FFFFFF"/>
+      </a:lt1>
+      <a:dk2>
+        <a:srgbClr val="44546A"/>
+      </a:dk2>
+      <a:lt2>
+        <a:srgbClr val="E7E6E6"/>
+      </a:lt2>
+      <a:accent1>
+        <a:srgbClr val="5B9BD5"/>
+      </a:accent1>
+      <a:accent2>
+        <a:srgbClr val="ED7D31"/>
+      </a:accent2>
+      <a:accent3>
+        <a:srgbClr val="A5A5A5"/>
+      </a:accent3>
+      <a:accent4>
+        <a:srgbClr val="FFC000"/>
+      </a:accent4>
+      <a:accent5>
+        <a:srgbClr val="4472C4"/>
+      </a:accent5>
+      <a:accent6>
+        <a:srgbClr val="70AD47"/>
+      </a:accent6>
+      <a:hlink>
+        <a:srgbClr val="0563C1"/>
+      </a:hlink>
+      <a:folHlink>
+        <a:srgbClr val="954F72"/>
+      </a:folHlink>
+    </a:clrScheme>
+    <a:fontScheme name="Office">
+      <a:majorFont>
+        <a:latin typeface="Calibri Light" panose="020F0302020204030204"/>
+        <a:ea typeface=""/>
+        <a:cs typeface=""/>
+        <a:font script="Jpan" typeface="游ゴシック Light"/>
+        <a:font script="Hang" typeface="맑은 고딕"/>
+        <a:font script="Hans" typeface="等线 Light"/>
+        <a:font script="Hant" typeface="新細明體"/>
+        <a:font script="Arab" typeface="Times New Roman"/>
+        <a:font script="Hebr" typeface="Times New Roman"/>
+        <a:font script="Thai" typeface="Angsana New"/>
+        <a:font script="Ethi" typeface="Nyala"/>
+        <a:font script="Beng" typeface="Vrinda"/>
+        <a:font script="Gujr" typeface="Shruti"/>
+        <a:font script="Khmr" typeface="MoolBoran"/>
+        <a:font script="Knda" typeface="Tunga"/>
+        <a:font script="Guru" typeface="Raavi"/>
+        <a:font script="Cans" typeface="Euphemia"/>
+        <a:font script="Cher" typeface="Plantagenet Cherokee"/>
+        <a:font script="Yiii" typeface="Microsoft Yi Baiti"/>
+        <a:font script="Tibt" typeface="Microsoft Himalaya"/>
+        <a:font script="Thaa" typeface="MV Boli"/>
+        <a:font script="Deva" typeface="Mangal"/>
+        <a:font script="Telu" typeface="Gautami"/>
+        <a:font script="Taml" typeface="Latha"/>
+        <a:font script="Syrc" typeface="Estrangelo Edessa"/>
+        <a:font script="Orya" typeface="Kalinga"/>
+        <a:font script="Mlym" typeface="Kartika"/>
+        <a:font script="Laoo" typeface="DokChampa"/>
+        <a:font script="Sinh" typeface="Iskoola Pota"/>
+        <a:font script="Mong" typeface="Mongolian Baiti"/>
+        <a:font script="Viet" typeface="Times New Roman"/>
+        <a:font script="Uigh" typeface="Microsoft Uighur"/>
+        <a:font script="Geor" typeface="Sylfaen"/>
+        <a:font script="Armn" typeface="Arial"/>
+        <a:font script="Bugi" typeface="Leelawadee UI"/>
+        <a:font script="Bopo" typeface="Microsoft JhengHei"/>
+        <a:font script="Java" typeface="Javanese Text"/>
+        <a:font script="Lisu" typeface="Segoe UI"/>
+        <a:font script="Mymr" typeface="Myanmar Text"/>
+        <a:font script="Nkoo" typeface="Ebrima"/>
+        <a:font script="Olck" typeface="Nirmala UI"/>
+        <a:font script="Osma" typeface="Ebrima"/>
+        <a:font script="Phag" typeface="Phagspa"/>
+        <a:font script="Syrn" typeface="Estrangelo Edessa"/>
+        <a:font script="Syrj" typeface="Estrangelo Edessa"/>
+        <a:font script="Syre" typeface="Estrangelo Edessa"/>
+        <a:font script="Sora" typeface="Nirmala UI"/>
+        <a:font script="Tale" typeface="Microsoft Tai Le"/>
+        <a:font script="Talu" typeface="Microsoft New Tai Lue"/>
+        <a:font script="Tfng" typeface="Ebrima"/>
+      </a:majorFont>
+      <a:minorFont>
+        <a:latin typeface="Calibri" panose="020F0502020204030204"/>
+        <a:ea typeface=""/>
+        <a:cs typeface=""/>
+        <a:font script="Jpan" typeface="游ゴシック"/>
+        <a:font script="Hang" typeface="맑은 고딕"/>
+        <a:font script="Hans" typeface="等线"/>
+        <a:font script="Hant" typeface="新細明體"/>
+        <a:font script="Arab" typeface="Arial"/>
+        <a:font script="Hebr" typeface="Arial"/>
+        <a:font script="Thai" typeface="Cordia New"/>
+        <a:font script="Ethi" typeface="Nyala"/>
+        <a:font script="Beng" typeface="Vrinda"/>
+        <a:font script="Gujr" typeface="Shruti"/>
+        <a:font script="Khmr" typeface="DaunPenh"/>
+        <a:font script="Knda" typeface="Tunga"/>
+        <a:font script="Guru" typeface="Raavi"/>
+        <a:font script="Cans" typeface="Euphemia"/>
+        <a:font script="Cher" typeface="Plantagenet Cherokee"/>
+        <a:font script="Yiii" typeface="Microsoft Yi Baiti"/>
+        <a:font script="Tibt" typeface="Microsoft Himalaya"/>
+        <a:font script="Thaa" typeface="MV Boli"/>
+        <a:font script="Deva" typeface="Mangal"/>
+        <a:font script="Telu" typeface="Gautami"/>
+        <a:font script="Taml" typeface="Latha"/>
+        <a:font script="Syrc" typeface="Estrangelo Edessa"/>
+        <a:font script="Orya" typeface="Kalinga"/>
+        <a:font script="Mlym" typeface="Kartika"/>
+        <a:font script="Laoo" typeface="DokChampa"/>
+        <a:font script="Sinh" typeface="Iskoola Pota"/>
+        <a:font script="Mong" typeface="Mongolian Baiti"/>
+        <a:font script="Viet" typeface="Arial"/>
+        <a:font script="Uigh" typeface="Microsoft Uighur"/>
+        <a:font script="Geor" typeface="Sylfaen"/>
+        <a:font script="Armn" typeface="Arial"/>
+        <a:font script="Bugi" typeface="Leelawadee UI"/>
+        <a:font script="Bopo" typeface="Microsoft JhengHei"/>
+        <a:font script="Java" typeface="Javanese Text"/>
+        <a:font script="Lisu" typeface="Segoe UI"/>
+        <a:font script="Mymr" typeface="Myanmar Text"/>
+        <a:font script="Nkoo" typeface="Ebrima"/>
+        <a:font script="Olck" typeface="Nirmala UI"/>
+        <a:font script="Osma" typeface="Ebrima"/>
+        <a:font script="Phag" typeface="Phagspa"/>
+        <a:font script="Syrn" typeface="Estrangelo Edessa"/>
+        <a:font script="Syrj" typeface="Estrangelo Edessa"/>
+        <a:font script="Syre" typeface="Estrangelo Edessa"/>
+        <a:font script="Sora" typeface="Nirmala UI"/>
+        <a:font script="Tale" typeface="Microsoft Tai Le"/>
+        <a:font script="Talu" typeface="Microsoft New Tai Lue"/>
+        <a:font script="Tfng" typeface="Ebrima"/>
+      </a:minorFont>
+    </a:fontScheme>
+    <a:fmtScheme name="Office">
+      <a:fillStyleLst>
+        <a:solidFill>
+          <a:schemeClr val="phClr"/>
+        </a:solidFill>
+        <a:gradFill rotWithShape="1">
+          <a:gsLst>
+            <a:gs pos="0">
+              <a:schemeClr val="phClr">
+                <a:lumMod val="110000"/>
+                <a:satMod val="105000"/>
+                <a:tint val="67000"/>
+              </a:schemeClr>
+            </a:gs>
+            <a:gs pos="50000">
+              <a:schemeClr val="phClr">
+                <a:lumMod val="105000"/>
+                <a:satMod val="103000"/>
+                <a:tint val="73000"/>
+              </a:schemeClr>
+            </a:gs>
+            <a:gs pos="100000">
+              <a:schemeClr val="phClr">
+                <a:lumMod val="105000"/>
+                <a:satMod val="109000"/>
+                <a:tint val="81000"/>
+              </a:schemeClr>
+            </a:gs>
+          </a:gsLst>
+          <a:lin ang="5400000" scaled="0"/>
+        </a:gradFill>
+        <a:gradFill rotWithShape="1">
+          <a:gsLst>
+            <a:gs pos="0">
+              <a:schemeClr val="phClr">
+                <a:satMod val="103000"/>
+                <a:lumMod val="102000"/>
+                <a:tint val="94000"/>
+              </a:schemeClr>
+            </a:gs>
+            <a:gs pos="50000">
+              <a:schemeClr val="phClr">
+                <a:satMod val="110000"/>
+                <a:lumMod val="100000"/>
+                <a:shade val="100000"/>
+              </a:schemeClr>
+            </a:gs>
+            <a:gs pos="100000">
+              <a:schemeClr val="phClr">
+                <a:lumMod val="99000"/>
+                <a:satMod val="120000"/>
+                <a:shade val="78000"/>
+              </a:schemeClr>
+            </a:gs>
+          </a:gsLst>
+          <a:lin ang="5400000" scaled="0"/>
+        </a:gradFill>
+      </a:fillStyleLst>
+      <a:lnStyleLst>
+        <a:ln w="6350" cap="flat" cmpd="sng" algn="ctr">
+          <a:solidFill>
+            <a:schemeClr val="phClr"/>
+          </a:solidFill>
+          <a:prstDash val="solid"/>
+          <a:miter lim="800000"/>
+        </a:ln>
+        <a:ln w="12700" cap="flat" cmpd="sng" algn="ctr">
+          <a:solidFill>
+            <a:schemeClr val="phClr"/>
+          </a:solidFill>
+          <a:prstDash val="solid"/>
+          <a:miter lim="800000"/>
+        </a:ln>
+        <a:ln w="19050" cap="flat" cmpd="sng" algn="ctr">
+          <a:solidFill>
+            <a:schemeClr val="phClr"/>
+          </a:solidFill>
+          <a:prstDash val="solid"/>
+          <a:miter lim="800000"/>
+        </a:ln>
+      </a:lnStyleLst>
+      <a:effectStyleLst>
+        <a:effectStyle>
+          <a:effectLst/>
+        </a:effectStyle>
+        <a:effectStyle>
+          <a:effectLst/>
+        </a:effectStyle>
+        <a:effectStyle>
+          <a:effectLst>
+            <a:outerShdw blurRad="57150" dist="19050" dir="5400000" algn="ctr" rotWithShape="0">
+              <a:srgbClr val="000000">
+                <a:alpha val="63000"/>
+              </a:srgbClr>
+            </a:outerShdw>
+          </a:effectLst>
+        </a:effectStyle>
+      </a:effectStyleLst>
+      <a:bgFillStyleLst>
+        <a:solidFill>
+          <a:schemeClr val="phClr"/>
+        </a:solidFill>
+        <a:solidFill>
+          <a:schemeClr val="phClr">
+            <a:tint val="95000"/>
+            <a:satMod val="170000"/>
+          </a:schemeClr>
+        </a:solidFill>
+        <a:gradFill rotWithShape="1">
+          <a:gsLst>
+            <a:gs pos="0">
+              <a:schemeClr val="phClr">
+                <a:tint val="93000"/>
+                <a:satMod val="150000"/>
+                <a:shade val="98000"/>
+                <a:lumMod val="102000"/>
+              </a:schemeClr>
+            </a:gs>
+            <a:gs pos="50000">
+              <a:schemeClr val="phClr">
+                <a:tint val="98000"/>
+                <a:satMod val="130000"/>
+                <a:shade val="90000"/>
+                <a:lumMod val="103000"/>
+              </a:schemeClr>
+            </a:gs>
+            <a:gs pos="100000">
+              <a:schemeClr val="phClr">
+                <a:shade val="63000"/>
+                <a:satMod val="120000"/>
+              </a:schemeClr>
+            </a:gs>
+          </a:gsLst>
+          <a:lin ang="5400000" scaled="0"/>
+        </a:gradFill>
+      </a:bgFillStyleLst>
+    </a:fmtScheme>
+  </a:themeElements>
+  <a:objectDefaults/>
+  <a:extraClrSchemeLst/>
+  <a:extLst>
+    <a:ext uri="{05A4C25C-085E-4340-85A3-A5531E510DB2}">
+      <thm15:themeFamily xmlns:thm15="http://schemas.microsoft.com/office/thememl/2012/main" name="Office Theme" id="{62F939B6-93AF-4DB8-9C6B-D6C7DFDC589F}" vid="{4A3C46E8-61CC-4603-A589-7422A47A8E4A}"/>
+    </a:ext>
+  </a:extLst>
+</a:theme>
 </file>
</xml_diff>